<commit_message>
Update System Design V2 - Storage Engine
We found PG doesn't work with MultiPAXOS, we should abondon the PG
concept.

System Desgin V2 is failed.

Signed-off-by: Dong Yuan <yuandong1222@gmail.com>
</commit_message>
<xml_diff>
--- a/doc/SystemDesignV2/10.pic.pptx
+++ b/doc/SystemDesignV2/10.pic.pptx
@@ -5,14 +5,16 @@
     <p:sldMasterId id="2147483648" r:id="rId1"/>
   </p:sldMasterIdLst>
   <p:notesMasterIdLst>
-    <p:notesMasterId r:id="rId7"/>
+    <p:notesMasterId r:id="rId9"/>
   </p:notesMasterIdLst>
   <p:sldIdLst>
     <p:sldId id="265" r:id="rId2"/>
     <p:sldId id="266" r:id="rId3"/>
     <p:sldId id="267" r:id="rId4"/>
     <p:sldId id="268" r:id="rId5"/>
-    <p:sldId id="263" r:id="rId6"/>
+    <p:sldId id="269" r:id="rId6"/>
+    <p:sldId id="270" r:id="rId7"/>
+    <p:sldId id="263" r:id="rId8"/>
   </p:sldIdLst>
   <p:sldSz cx="12192000" cy="6858000"/>
   <p:notesSz cx="6858000" cy="9144000"/>
@@ -9462,7 +9464,7 @@
           <a:p>
             <a:r>
               <a:rPr lang="en-US" dirty="0" smtClean="0"/>
-              <a:t>Data Distribution</a:t>
+              <a:t>Data Distribution of Ceph</a:t>
             </a:r>
             <a:endParaRPr lang="en-US" dirty="0"/>
           </a:p>
@@ -12956,6 +12958,4573 @@
           <a:p>
             <a:r>
               <a:rPr lang="en-US" altLang="zh-CN" dirty="0" smtClean="0"/>
+              <a:t>Storage</a:t>
+            </a:r>
+            <a:r>
+              <a:rPr lang="zh-CN" altLang="en-US" dirty="0" smtClean="0"/>
+              <a:t> </a:t>
+            </a:r>
+            <a:r>
+              <a:rPr lang="en-US" altLang="zh-CN" dirty="0" smtClean="0"/>
+              <a:t>Engine</a:t>
+            </a:r>
+            <a:r>
+              <a:rPr lang="zh-CN" altLang="en-US" dirty="0" smtClean="0"/>
+              <a:t> </a:t>
+            </a:r>
+            <a:r>
+              <a:rPr lang="en-US" altLang="zh-CN" dirty="0" smtClean="0"/>
+              <a:t>Data</a:t>
+            </a:r>
+            <a:r>
+              <a:rPr lang="zh-CN" altLang="en-US" dirty="0" smtClean="0"/>
+              <a:t> </a:t>
+            </a:r>
+            <a:r>
+              <a:rPr lang="en-US" altLang="zh-CN" dirty="0" smtClean="0"/>
+              <a:t>Model</a:t>
+            </a:r>
+            <a:endParaRPr lang="en-US" dirty="0"/>
+          </a:p>
+        </p:txBody>
+      </p:sp>
+      <p:sp>
+        <p:nvSpPr>
+          <p:cNvPr id="40" name="Oval 39"/>
+          <p:cNvSpPr/>
+          <p:nvPr/>
+        </p:nvSpPr>
+        <p:spPr>
+          <a:xfrm>
+            <a:off x="3798277" y="1955409"/>
+            <a:ext cx="4389120" cy="4389120"/>
+          </a:xfrm>
+          <a:prstGeom prst="ellipse">
+            <a:avLst/>
+          </a:prstGeom>
+        </p:spPr>
+        <p:style>
+          <a:lnRef idx="2">
+            <a:schemeClr val="accent1"/>
+          </a:lnRef>
+          <a:fillRef idx="1">
+            <a:schemeClr val="lt1"/>
+          </a:fillRef>
+          <a:effectRef idx="0">
+            <a:schemeClr val="accent1"/>
+          </a:effectRef>
+          <a:fontRef idx="minor">
+            <a:schemeClr val="dk1"/>
+          </a:fontRef>
+        </p:style>
+        <p:txBody>
+          <a:bodyPr rtlCol="0" anchor="ctr"/>
+          <a:lstStyle/>
+          <a:p>
+            <a:pPr algn="ctr"/>
+            <a:endParaRPr lang="en-US"/>
+          </a:p>
+        </p:txBody>
+      </p:sp>
+      <p:grpSp>
+        <p:nvGrpSpPr>
+          <p:cNvPr id="49" name="Group 48"/>
+          <p:cNvGrpSpPr/>
+          <p:nvPr/>
+        </p:nvGrpSpPr>
+        <p:grpSpPr>
+          <a:xfrm>
+            <a:off x="4543864" y="2855742"/>
+            <a:ext cx="1012873" cy="1012873"/>
+            <a:chOff x="4543864" y="2855742"/>
+            <a:chExt cx="1012873" cy="1012873"/>
+          </a:xfrm>
+        </p:grpSpPr>
+        <p:sp>
+          <p:nvSpPr>
+            <p:cNvPr id="41" name="Oval 40"/>
+            <p:cNvSpPr/>
+            <p:nvPr/>
+          </p:nvSpPr>
+          <p:spPr>
+            <a:xfrm>
+              <a:off x="4543864" y="2855742"/>
+              <a:ext cx="1012873" cy="1012873"/>
+            </a:xfrm>
+            <a:prstGeom prst="ellipse">
+              <a:avLst/>
+            </a:prstGeom>
+          </p:spPr>
+          <p:style>
+            <a:lnRef idx="2">
+              <a:schemeClr val="accent4"/>
+            </a:lnRef>
+            <a:fillRef idx="1">
+              <a:schemeClr val="lt1"/>
+            </a:fillRef>
+            <a:effectRef idx="0">
+              <a:schemeClr val="accent4"/>
+            </a:effectRef>
+            <a:fontRef idx="minor">
+              <a:schemeClr val="dk1"/>
+            </a:fontRef>
+          </p:style>
+          <p:txBody>
+            <a:bodyPr rtlCol="0" anchor="ctr"/>
+            <a:lstStyle/>
+            <a:p>
+              <a:pPr algn="ctr"/>
+              <a:endParaRPr lang="en-US"/>
+            </a:p>
+          </p:txBody>
+        </p:sp>
+        <p:sp>
+          <p:nvSpPr>
+            <p:cNvPr id="43" name="Oval 42"/>
+            <p:cNvSpPr/>
+            <p:nvPr/>
+          </p:nvSpPr>
+          <p:spPr>
+            <a:xfrm>
+              <a:off x="4903893" y="3095413"/>
+              <a:ext cx="155787" cy="155787"/>
+            </a:xfrm>
+            <a:prstGeom prst="ellipse">
+              <a:avLst/>
+            </a:prstGeom>
+          </p:spPr>
+          <p:style>
+            <a:lnRef idx="2">
+              <a:schemeClr val="accent6">
+                <a:shade val="50000"/>
+              </a:schemeClr>
+            </a:lnRef>
+            <a:fillRef idx="1">
+              <a:schemeClr val="accent6"/>
+            </a:fillRef>
+            <a:effectRef idx="0">
+              <a:schemeClr val="accent6"/>
+            </a:effectRef>
+            <a:fontRef idx="minor">
+              <a:schemeClr val="lt1"/>
+            </a:fontRef>
+          </p:style>
+          <p:txBody>
+            <a:bodyPr rtlCol="0" anchor="ctr"/>
+            <a:lstStyle/>
+            <a:p>
+              <a:pPr algn="ctr"/>
+              <a:endParaRPr lang="en-US"/>
+            </a:p>
+          </p:txBody>
+        </p:sp>
+        <p:sp>
+          <p:nvSpPr>
+            <p:cNvPr id="44" name="Oval 43"/>
+            <p:cNvSpPr/>
+            <p:nvPr/>
+          </p:nvSpPr>
+          <p:spPr>
+            <a:xfrm>
+              <a:off x="5137573" y="3112347"/>
+              <a:ext cx="155787" cy="155787"/>
+            </a:xfrm>
+            <a:prstGeom prst="ellipse">
+              <a:avLst/>
+            </a:prstGeom>
+          </p:spPr>
+          <p:style>
+            <a:lnRef idx="2">
+              <a:schemeClr val="accent6">
+                <a:shade val="50000"/>
+              </a:schemeClr>
+            </a:lnRef>
+            <a:fillRef idx="1">
+              <a:schemeClr val="accent6"/>
+            </a:fillRef>
+            <a:effectRef idx="0">
+              <a:schemeClr val="accent6"/>
+            </a:effectRef>
+            <a:fontRef idx="minor">
+              <a:schemeClr val="lt1"/>
+            </a:fontRef>
+          </p:style>
+          <p:txBody>
+            <a:bodyPr rtlCol="0" anchor="ctr"/>
+            <a:lstStyle/>
+            <a:p>
+              <a:pPr algn="ctr"/>
+              <a:endParaRPr lang="en-US"/>
+            </a:p>
+          </p:txBody>
+        </p:sp>
+        <p:sp>
+          <p:nvSpPr>
+            <p:cNvPr id="45" name="Oval 44"/>
+            <p:cNvSpPr/>
+            <p:nvPr/>
+          </p:nvSpPr>
+          <p:spPr>
+            <a:xfrm>
+              <a:off x="5289973" y="3264747"/>
+              <a:ext cx="155787" cy="155787"/>
+            </a:xfrm>
+            <a:prstGeom prst="ellipse">
+              <a:avLst/>
+            </a:prstGeom>
+          </p:spPr>
+          <p:style>
+            <a:lnRef idx="2">
+              <a:schemeClr val="accent6">
+                <a:shade val="50000"/>
+              </a:schemeClr>
+            </a:lnRef>
+            <a:fillRef idx="1">
+              <a:schemeClr val="accent6"/>
+            </a:fillRef>
+            <a:effectRef idx="0">
+              <a:schemeClr val="accent6"/>
+            </a:effectRef>
+            <a:fontRef idx="minor">
+              <a:schemeClr val="lt1"/>
+            </a:fontRef>
+          </p:style>
+          <p:txBody>
+            <a:bodyPr rtlCol="0" anchor="ctr"/>
+            <a:lstStyle/>
+            <a:p>
+              <a:pPr algn="ctr"/>
+              <a:endParaRPr lang="en-US"/>
+            </a:p>
+          </p:txBody>
+        </p:sp>
+        <p:sp>
+          <p:nvSpPr>
+            <p:cNvPr id="46" name="Oval 45"/>
+            <p:cNvSpPr/>
+            <p:nvPr/>
+          </p:nvSpPr>
+          <p:spPr>
+            <a:xfrm>
+              <a:off x="4718409" y="3261360"/>
+              <a:ext cx="155787" cy="155787"/>
+            </a:xfrm>
+            <a:prstGeom prst="ellipse">
+              <a:avLst/>
+            </a:prstGeom>
+          </p:spPr>
+          <p:style>
+            <a:lnRef idx="2">
+              <a:schemeClr val="accent6">
+                <a:shade val="50000"/>
+              </a:schemeClr>
+            </a:lnRef>
+            <a:fillRef idx="1">
+              <a:schemeClr val="accent6"/>
+            </a:fillRef>
+            <a:effectRef idx="0">
+              <a:schemeClr val="accent6"/>
+            </a:effectRef>
+            <a:fontRef idx="minor">
+              <a:schemeClr val="lt1"/>
+            </a:fontRef>
+          </p:style>
+          <p:txBody>
+            <a:bodyPr rtlCol="0" anchor="ctr"/>
+            <a:lstStyle/>
+            <a:p>
+              <a:pPr algn="ctr"/>
+              <a:endParaRPr lang="en-US"/>
+            </a:p>
+          </p:txBody>
+        </p:sp>
+        <p:sp>
+          <p:nvSpPr>
+            <p:cNvPr id="47" name="Oval 46"/>
+            <p:cNvSpPr/>
+            <p:nvPr/>
+          </p:nvSpPr>
+          <p:spPr>
+            <a:xfrm>
+              <a:off x="4934373" y="3362960"/>
+              <a:ext cx="155787" cy="155787"/>
+            </a:xfrm>
+            <a:prstGeom prst="ellipse">
+              <a:avLst/>
+            </a:prstGeom>
+          </p:spPr>
+          <p:style>
+            <a:lnRef idx="2">
+              <a:schemeClr val="accent6">
+                <a:shade val="50000"/>
+              </a:schemeClr>
+            </a:lnRef>
+            <a:fillRef idx="1">
+              <a:schemeClr val="accent6"/>
+            </a:fillRef>
+            <a:effectRef idx="0">
+              <a:schemeClr val="accent6"/>
+            </a:effectRef>
+            <a:fontRef idx="minor">
+              <a:schemeClr val="lt1"/>
+            </a:fontRef>
+          </p:style>
+          <p:txBody>
+            <a:bodyPr rtlCol="0" anchor="ctr"/>
+            <a:lstStyle/>
+            <a:p>
+              <a:pPr algn="ctr"/>
+              <a:endParaRPr lang="en-US"/>
+            </a:p>
+          </p:txBody>
+        </p:sp>
+        <p:sp>
+          <p:nvSpPr>
+            <p:cNvPr id="48" name="Oval 47"/>
+            <p:cNvSpPr/>
+            <p:nvPr/>
+          </p:nvSpPr>
+          <p:spPr>
+            <a:xfrm>
+              <a:off x="5112173" y="3501162"/>
+              <a:ext cx="155787" cy="155787"/>
+            </a:xfrm>
+            <a:prstGeom prst="ellipse">
+              <a:avLst/>
+            </a:prstGeom>
+          </p:spPr>
+          <p:style>
+            <a:lnRef idx="2">
+              <a:schemeClr val="accent6">
+                <a:shade val="50000"/>
+              </a:schemeClr>
+            </a:lnRef>
+            <a:fillRef idx="1">
+              <a:schemeClr val="accent6"/>
+            </a:fillRef>
+            <a:effectRef idx="0">
+              <a:schemeClr val="accent6"/>
+            </a:effectRef>
+            <a:fontRef idx="minor">
+              <a:schemeClr val="lt1"/>
+            </a:fontRef>
+          </p:style>
+          <p:txBody>
+            <a:bodyPr rtlCol="0" anchor="ctr"/>
+            <a:lstStyle/>
+            <a:p>
+              <a:pPr algn="ctr"/>
+              <a:endParaRPr lang="en-US"/>
+            </a:p>
+          </p:txBody>
+        </p:sp>
+      </p:grpSp>
+      <p:grpSp>
+        <p:nvGrpSpPr>
+          <p:cNvPr id="50" name="Group 49"/>
+          <p:cNvGrpSpPr/>
+          <p:nvPr/>
+        </p:nvGrpSpPr>
+        <p:grpSpPr>
+          <a:xfrm>
+            <a:off x="5823101" y="2361596"/>
+            <a:ext cx="1012873" cy="1012873"/>
+            <a:chOff x="4543864" y="2855742"/>
+            <a:chExt cx="1012873" cy="1012873"/>
+          </a:xfrm>
+        </p:grpSpPr>
+        <p:sp>
+          <p:nvSpPr>
+            <p:cNvPr id="51" name="Oval 50"/>
+            <p:cNvSpPr/>
+            <p:nvPr/>
+          </p:nvSpPr>
+          <p:spPr>
+            <a:xfrm>
+              <a:off x="4543864" y="2855742"/>
+              <a:ext cx="1012873" cy="1012873"/>
+            </a:xfrm>
+            <a:prstGeom prst="ellipse">
+              <a:avLst/>
+            </a:prstGeom>
+          </p:spPr>
+          <p:style>
+            <a:lnRef idx="2">
+              <a:schemeClr val="accent4"/>
+            </a:lnRef>
+            <a:fillRef idx="1">
+              <a:schemeClr val="lt1"/>
+            </a:fillRef>
+            <a:effectRef idx="0">
+              <a:schemeClr val="accent4"/>
+            </a:effectRef>
+            <a:fontRef idx="minor">
+              <a:schemeClr val="dk1"/>
+            </a:fontRef>
+          </p:style>
+          <p:txBody>
+            <a:bodyPr rtlCol="0" anchor="ctr"/>
+            <a:lstStyle/>
+            <a:p>
+              <a:pPr algn="ctr"/>
+              <a:endParaRPr lang="en-US"/>
+            </a:p>
+          </p:txBody>
+        </p:sp>
+        <p:sp>
+          <p:nvSpPr>
+            <p:cNvPr id="52" name="Oval 51"/>
+            <p:cNvSpPr/>
+            <p:nvPr/>
+          </p:nvSpPr>
+          <p:spPr>
+            <a:xfrm>
+              <a:off x="4903893" y="3095413"/>
+              <a:ext cx="155787" cy="155787"/>
+            </a:xfrm>
+            <a:prstGeom prst="ellipse">
+              <a:avLst/>
+            </a:prstGeom>
+          </p:spPr>
+          <p:style>
+            <a:lnRef idx="2">
+              <a:schemeClr val="accent6">
+                <a:shade val="50000"/>
+              </a:schemeClr>
+            </a:lnRef>
+            <a:fillRef idx="1">
+              <a:schemeClr val="accent6"/>
+            </a:fillRef>
+            <a:effectRef idx="0">
+              <a:schemeClr val="accent6"/>
+            </a:effectRef>
+            <a:fontRef idx="minor">
+              <a:schemeClr val="lt1"/>
+            </a:fontRef>
+          </p:style>
+          <p:txBody>
+            <a:bodyPr rtlCol="0" anchor="ctr"/>
+            <a:lstStyle/>
+            <a:p>
+              <a:pPr algn="ctr"/>
+              <a:endParaRPr lang="en-US"/>
+            </a:p>
+          </p:txBody>
+        </p:sp>
+        <p:sp>
+          <p:nvSpPr>
+            <p:cNvPr id="53" name="Oval 52"/>
+            <p:cNvSpPr/>
+            <p:nvPr/>
+          </p:nvSpPr>
+          <p:spPr>
+            <a:xfrm>
+              <a:off x="5137573" y="3112347"/>
+              <a:ext cx="155787" cy="155787"/>
+            </a:xfrm>
+            <a:prstGeom prst="ellipse">
+              <a:avLst/>
+            </a:prstGeom>
+          </p:spPr>
+          <p:style>
+            <a:lnRef idx="2">
+              <a:schemeClr val="accent6">
+                <a:shade val="50000"/>
+              </a:schemeClr>
+            </a:lnRef>
+            <a:fillRef idx="1">
+              <a:schemeClr val="accent6"/>
+            </a:fillRef>
+            <a:effectRef idx="0">
+              <a:schemeClr val="accent6"/>
+            </a:effectRef>
+            <a:fontRef idx="minor">
+              <a:schemeClr val="lt1"/>
+            </a:fontRef>
+          </p:style>
+          <p:txBody>
+            <a:bodyPr rtlCol="0" anchor="ctr"/>
+            <a:lstStyle/>
+            <a:p>
+              <a:pPr algn="ctr"/>
+              <a:endParaRPr lang="en-US"/>
+            </a:p>
+          </p:txBody>
+        </p:sp>
+        <p:sp>
+          <p:nvSpPr>
+            <p:cNvPr id="54" name="Oval 53"/>
+            <p:cNvSpPr/>
+            <p:nvPr/>
+          </p:nvSpPr>
+          <p:spPr>
+            <a:xfrm>
+              <a:off x="5289973" y="3264747"/>
+              <a:ext cx="155787" cy="155787"/>
+            </a:xfrm>
+            <a:prstGeom prst="ellipse">
+              <a:avLst/>
+            </a:prstGeom>
+          </p:spPr>
+          <p:style>
+            <a:lnRef idx="2">
+              <a:schemeClr val="accent6">
+                <a:shade val="50000"/>
+              </a:schemeClr>
+            </a:lnRef>
+            <a:fillRef idx="1">
+              <a:schemeClr val="accent6"/>
+            </a:fillRef>
+            <a:effectRef idx="0">
+              <a:schemeClr val="accent6"/>
+            </a:effectRef>
+            <a:fontRef idx="minor">
+              <a:schemeClr val="lt1"/>
+            </a:fontRef>
+          </p:style>
+          <p:txBody>
+            <a:bodyPr rtlCol="0" anchor="ctr"/>
+            <a:lstStyle/>
+            <a:p>
+              <a:pPr algn="ctr"/>
+              <a:endParaRPr lang="en-US"/>
+            </a:p>
+          </p:txBody>
+        </p:sp>
+        <p:sp>
+          <p:nvSpPr>
+            <p:cNvPr id="55" name="Oval 54"/>
+            <p:cNvSpPr/>
+            <p:nvPr/>
+          </p:nvSpPr>
+          <p:spPr>
+            <a:xfrm>
+              <a:off x="4718409" y="3261360"/>
+              <a:ext cx="155787" cy="155787"/>
+            </a:xfrm>
+            <a:prstGeom prst="ellipse">
+              <a:avLst/>
+            </a:prstGeom>
+          </p:spPr>
+          <p:style>
+            <a:lnRef idx="2">
+              <a:schemeClr val="accent6">
+                <a:shade val="50000"/>
+              </a:schemeClr>
+            </a:lnRef>
+            <a:fillRef idx="1">
+              <a:schemeClr val="accent6"/>
+            </a:fillRef>
+            <a:effectRef idx="0">
+              <a:schemeClr val="accent6"/>
+            </a:effectRef>
+            <a:fontRef idx="minor">
+              <a:schemeClr val="lt1"/>
+            </a:fontRef>
+          </p:style>
+          <p:txBody>
+            <a:bodyPr rtlCol="0" anchor="ctr"/>
+            <a:lstStyle/>
+            <a:p>
+              <a:pPr algn="ctr"/>
+              <a:endParaRPr lang="en-US"/>
+            </a:p>
+          </p:txBody>
+        </p:sp>
+        <p:sp>
+          <p:nvSpPr>
+            <p:cNvPr id="56" name="Oval 55"/>
+            <p:cNvSpPr/>
+            <p:nvPr/>
+          </p:nvSpPr>
+          <p:spPr>
+            <a:xfrm>
+              <a:off x="4934373" y="3362960"/>
+              <a:ext cx="155787" cy="155787"/>
+            </a:xfrm>
+            <a:prstGeom prst="ellipse">
+              <a:avLst/>
+            </a:prstGeom>
+          </p:spPr>
+          <p:style>
+            <a:lnRef idx="2">
+              <a:schemeClr val="accent6">
+                <a:shade val="50000"/>
+              </a:schemeClr>
+            </a:lnRef>
+            <a:fillRef idx="1">
+              <a:schemeClr val="accent6"/>
+            </a:fillRef>
+            <a:effectRef idx="0">
+              <a:schemeClr val="accent6"/>
+            </a:effectRef>
+            <a:fontRef idx="minor">
+              <a:schemeClr val="lt1"/>
+            </a:fontRef>
+          </p:style>
+          <p:txBody>
+            <a:bodyPr rtlCol="0" anchor="ctr"/>
+            <a:lstStyle/>
+            <a:p>
+              <a:pPr algn="ctr"/>
+              <a:endParaRPr lang="en-US"/>
+            </a:p>
+          </p:txBody>
+        </p:sp>
+        <p:sp>
+          <p:nvSpPr>
+            <p:cNvPr id="57" name="Oval 56"/>
+            <p:cNvSpPr/>
+            <p:nvPr/>
+          </p:nvSpPr>
+          <p:spPr>
+            <a:xfrm>
+              <a:off x="5112173" y="3501162"/>
+              <a:ext cx="155787" cy="155787"/>
+            </a:xfrm>
+            <a:prstGeom prst="ellipse">
+              <a:avLst/>
+            </a:prstGeom>
+          </p:spPr>
+          <p:style>
+            <a:lnRef idx="2">
+              <a:schemeClr val="accent6">
+                <a:shade val="50000"/>
+              </a:schemeClr>
+            </a:lnRef>
+            <a:fillRef idx="1">
+              <a:schemeClr val="accent6"/>
+            </a:fillRef>
+            <a:effectRef idx="0">
+              <a:schemeClr val="accent6"/>
+            </a:effectRef>
+            <a:fontRef idx="minor">
+              <a:schemeClr val="lt1"/>
+            </a:fontRef>
+          </p:style>
+          <p:txBody>
+            <a:bodyPr rtlCol="0" anchor="ctr"/>
+            <a:lstStyle/>
+            <a:p>
+              <a:pPr algn="ctr"/>
+              <a:endParaRPr lang="en-US"/>
+            </a:p>
+          </p:txBody>
+        </p:sp>
+      </p:grpSp>
+      <p:grpSp>
+        <p:nvGrpSpPr>
+          <p:cNvPr id="58" name="Group 57"/>
+          <p:cNvGrpSpPr/>
+          <p:nvPr/>
+        </p:nvGrpSpPr>
+        <p:grpSpPr>
+          <a:xfrm>
+            <a:off x="5582955" y="3857888"/>
+            <a:ext cx="1012873" cy="1012873"/>
+            <a:chOff x="4543864" y="2855742"/>
+            <a:chExt cx="1012873" cy="1012873"/>
+          </a:xfrm>
+        </p:grpSpPr>
+        <p:sp>
+          <p:nvSpPr>
+            <p:cNvPr id="59" name="Oval 58"/>
+            <p:cNvSpPr/>
+            <p:nvPr/>
+          </p:nvSpPr>
+          <p:spPr>
+            <a:xfrm>
+              <a:off x="4543864" y="2855742"/>
+              <a:ext cx="1012873" cy="1012873"/>
+            </a:xfrm>
+            <a:prstGeom prst="ellipse">
+              <a:avLst/>
+            </a:prstGeom>
+          </p:spPr>
+          <p:style>
+            <a:lnRef idx="2">
+              <a:schemeClr val="accent4"/>
+            </a:lnRef>
+            <a:fillRef idx="1">
+              <a:schemeClr val="lt1"/>
+            </a:fillRef>
+            <a:effectRef idx="0">
+              <a:schemeClr val="accent4"/>
+            </a:effectRef>
+            <a:fontRef idx="minor">
+              <a:schemeClr val="dk1"/>
+            </a:fontRef>
+          </p:style>
+          <p:txBody>
+            <a:bodyPr rtlCol="0" anchor="ctr"/>
+            <a:lstStyle/>
+            <a:p>
+              <a:pPr algn="ctr"/>
+              <a:endParaRPr lang="en-US"/>
+            </a:p>
+          </p:txBody>
+        </p:sp>
+        <p:sp>
+          <p:nvSpPr>
+            <p:cNvPr id="60" name="Oval 59"/>
+            <p:cNvSpPr/>
+            <p:nvPr/>
+          </p:nvSpPr>
+          <p:spPr>
+            <a:xfrm>
+              <a:off x="4903893" y="3095413"/>
+              <a:ext cx="155787" cy="155787"/>
+            </a:xfrm>
+            <a:prstGeom prst="ellipse">
+              <a:avLst/>
+            </a:prstGeom>
+          </p:spPr>
+          <p:style>
+            <a:lnRef idx="2">
+              <a:schemeClr val="accent6">
+                <a:shade val="50000"/>
+              </a:schemeClr>
+            </a:lnRef>
+            <a:fillRef idx="1">
+              <a:schemeClr val="accent6"/>
+            </a:fillRef>
+            <a:effectRef idx="0">
+              <a:schemeClr val="accent6"/>
+            </a:effectRef>
+            <a:fontRef idx="minor">
+              <a:schemeClr val="lt1"/>
+            </a:fontRef>
+          </p:style>
+          <p:txBody>
+            <a:bodyPr rtlCol="0" anchor="ctr"/>
+            <a:lstStyle/>
+            <a:p>
+              <a:pPr algn="ctr"/>
+              <a:endParaRPr lang="en-US"/>
+            </a:p>
+          </p:txBody>
+        </p:sp>
+        <p:sp>
+          <p:nvSpPr>
+            <p:cNvPr id="61" name="Oval 60"/>
+            <p:cNvSpPr/>
+            <p:nvPr/>
+          </p:nvSpPr>
+          <p:spPr>
+            <a:xfrm>
+              <a:off x="5137573" y="3112347"/>
+              <a:ext cx="155787" cy="155787"/>
+            </a:xfrm>
+            <a:prstGeom prst="ellipse">
+              <a:avLst/>
+            </a:prstGeom>
+          </p:spPr>
+          <p:style>
+            <a:lnRef idx="2">
+              <a:schemeClr val="accent6">
+                <a:shade val="50000"/>
+              </a:schemeClr>
+            </a:lnRef>
+            <a:fillRef idx="1">
+              <a:schemeClr val="accent6"/>
+            </a:fillRef>
+            <a:effectRef idx="0">
+              <a:schemeClr val="accent6"/>
+            </a:effectRef>
+            <a:fontRef idx="minor">
+              <a:schemeClr val="lt1"/>
+            </a:fontRef>
+          </p:style>
+          <p:txBody>
+            <a:bodyPr rtlCol="0" anchor="ctr"/>
+            <a:lstStyle/>
+            <a:p>
+              <a:pPr algn="ctr"/>
+              <a:endParaRPr lang="en-US"/>
+            </a:p>
+          </p:txBody>
+        </p:sp>
+        <p:sp>
+          <p:nvSpPr>
+            <p:cNvPr id="62" name="Oval 61"/>
+            <p:cNvSpPr/>
+            <p:nvPr/>
+          </p:nvSpPr>
+          <p:spPr>
+            <a:xfrm>
+              <a:off x="5289973" y="3264747"/>
+              <a:ext cx="155787" cy="155787"/>
+            </a:xfrm>
+            <a:prstGeom prst="ellipse">
+              <a:avLst/>
+            </a:prstGeom>
+          </p:spPr>
+          <p:style>
+            <a:lnRef idx="2">
+              <a:schemeClr val="accent6">
+                <a:shade val="50000"/>
+              </a:schemeClr>
+            </a:lnRef>
+            <a:fillRef idx="1">
+              <a:schemeClr val="accent6"/>
+            </a:fillRef>
+            <a:effectRef idx="0">
+              <a:schemeClr val="accent6"/>
+            </a:effectRef>
+            <a:fontRef idx="minor">
+              <a:schemeClr val="lt1"/>
+            </a:fontRef>
+          </p:style>
+          <p:txBody>
+            <a:bodyPr rtlCol="0" anchor="ctr"/>
+            <a:lstStyle/>
+            <a:p>
+              <a:pPr algn="ctr"/>
+              <a:endParaRPr lang="en-US"/>
+            </a:p>
+          </p:txBody>
+        </p:sp>
+        <p:sp>
+          <p:nvSpPr>
+            <p:cNvPr id="63" name="Oval 62"/>
+            <p:cNvSpPr/>
+            <p:nvPr/>
+          </p:nvSpPr>
+          <p:spPr>
+            <a:xfrm>
+              <a:off x="4718409" y="3261360"/>
+              <a:ext cx="155787" cy="155787"/>
+            </a:xfrm>
+            <a:prstGeom prst="ellipse">
+              <a:avLst/>
+            </a:prstGeom>
+          </p:spPr>
+          <p:style>
+            <a:lnRef idx="2">
+              <a:schemeClr val="accent6">
+                <a:shade val="50000"/>
+              </a:schemeClr>
+            </a:lnRef>
+            <a:fillRef idx="1">
+              <a:schemeClr val="accent6"/>
+            </a:fillRef>
+            <a:effectRef idx="0">
+              <a:schemeClr val="accent6"/>
+            </a:effectRef>
+            <a:fontRef idx="minor">
+              <a:schemeClr val="lt1"/>
+            </a:fontRef>
+          </p:style>
+          <p:txBody>
+            <a:bodyPr rtlCol="0" anchor="ctr"/>
+            <a:lstStyle/>
+            <a:p>
+              <a:pPr algn="ctr"/>
+              <a:endParaRPr lang="en-US"/>
+            </a:p>
+          </p:txBody>
+        </p:sp>
+        <p:sp>
+          <p:nvSpPr>
+            <p:cNvPr id="64" name="Oval 63"/>
+            <p:cNvSpPr/>
+            <p:nvPr/>
+          </p:nvSpPr>
+          <p:spPr>
+            <a:xfrm>
+              <a:off x="4934373" y="3362960"/>
+              <a:ext cx="155787" cy="155787"/>
+            </a:xfrm>
+            <a:prstGeom prst="ellipse">
+              <a:avLst/>
+            </a:prstGeom>
+          </p:spPr>
+          <p:style>
+            <a:lnRef idx="2">
+              <a:schemeClr val="accent6">
+                <a:shade val="50000"/>
+              </a:schemeClr>
+            </a:lnRef>
+            <a:fillRef idx="1">
+              <a:schemeClr val="accent6"/>
+            </a:fillRef>
+            <a:effectRef idx="0">
+              <a:schemeClr val="accent6"/>
+            </a:effectRef>
+            <a:fontRef idx="minor">
+              <a:schemeClr val="lt1"/>
+            </a:fontRef>
+          </p:style>
+          <p:txBody>
+            <a:bodyPr rtlCol="0" anchor="ctr"/>
+            <a:lstStyle/>
+            <a:p>
+              <a:pPr algn="ctr"/>
+              <a:endParaRPr lang="en-US"/>
+            </a:p>
+          </p:txBody>
+        </p:sp>
+        <p:sp>
+          <p:nvSpPr>
+            <p:cNvPr id="65" name="Oval 64"/>
+            <p:cNvSpPr/>
+            <p:nvPr/>
+          </p:nvSpPr>
+          <p:spPr>
+            <a:xfrm>
+              <a:off x="5112173" y="3501162"/>
+              <a:ext cx="155787" cy="155787"/>
+            </a:xfrm>
+            <a:prstGeom prst="ellipse">
+              <a:avLst/>
+            </a:prstGeom>
+          </p:spPr>
+          <p:style>
+            <a:lnRef idx="2">
+              <a:schemeClr val="accent6">
+                <a:shade val="50000"/>
+              </a:schemeClr>
+            </a:lnRef>
+            <a:fillRef idx="1">
+              <a:schemeClr val="accent6"/>
+            </a:fillRef>
+            <a:effectRef idx="0">
+              <a:schemeClr val="accent6"/>
+            </a:effectRef>
+            <a:fontRef idx="minor">
+              <a:schemeClr val="lt1"/>
+            </a:fontRef>
+          </p:style>
+          <p:txBody>
+            <a:bodyPr rtlCol="0" anchor="ctr"/>
+            <a:lstStyle/>
+            <a:p>
+              <a:pPr algn="ctr"/>
+              <a:endParaRPr lang="en-US"/>
+            </a:p>
+          </p:txBody>
+        </p:sp>
+      </p:grpSp>
+      <p:grpSp>
+        <p:nvGrpSpPr>
+          <p:cNvPr id="66" name="Group 65"/>
+          <p:cNvGrpSpPr/>
+          <p:nvPr/>
+        </p:nvGrpSpPr>
+        <p:grpSpPr>
+          <a:xfrm>
+            <a:off x="4362193" y="4125220"/>
+            <a:ext cx="1012873" cy="1012873"/>
+            <a:chOff x="4543864" y="2855742"/>
+            <a:chExt cx="1012873" cy="1012873"/>
+          </a:xfrm>
+        </p:grpSpPr>
+        <p:sp>
+          <p:nvSpPr>
+            <p:cNvPr id="67" name="Oval 66"/>
+            <p:cNvSpPr/>
+            <p:nvPr/>
+          </p:nvSpPr>
+          <p:spPr>
+            <a:xfrm>
+              <a:off x="4543864" y="2855742"/>
+              <a:ext cx="1012873" cy="1012873"/>
+            </a:xfrm>
+            <a:prstGeom prst="ellipse">
+              <a:avLst/>
+            </a:prstGeom>
+          </p:spPr>
+          <p:style>
+            <a:lnRef idx="2">
+              <a:schemeClr val="accent4"/>
+            </a:lnRef>
+            <a:fillRef idx="1">
+              <a:schemeClr val="lt1"/>
+            </a:fillRef>
+            <a:effectRef idx="0">
+              <a:schemeClr val="accent4"/>
+            </a:effectRef>
+            <a:fontRef idx="minor">
+              <a:schemeClr val="dk1"/>
+            </a:fontRef>
+          </p:style>
+          <p:txBody>
+            <a:bodyPr rtlCol="0" anchor="ctr"/>
+            <a:lstStyle/>
+            <a:p>
+              <a:pPr algn="ctr"/>
+              <a:endParaRPr lang="en-US"/>
+            </a:p>
+          </p:txBody>
+        </p:sp>
+        <p:sp>
+          <p:nvSpPr>
+            <p:cNvPr id="68" name="Oval 67"/>
+            <p:cNvSpPr/>
+            <p:nvPr/>
+          </p:nvSpPr>
+          <p:spPr>
+            <a:xfrm>
+              <a:off x="4903893" y="3095413"/>
+              <a:ext cx="155787" cy="155787"/>
+            </a:xfrm>
+            <a:prstGeom prst="ellipse">
+              <a:avLst/>
+            </a:prstGeom>
+          </p:spPr>
+          <p:style>
+            <a:lnRef idx="2">
+              <a:schemeClr val="accent6">
+                <a:shade val="50000"/>
+              </a:schemeClr>
+            </a:lnRef>
+            <a:fillRef idx="1">
+              <a:schemeClr val="accent6"/>
+            </a:fillRef>
+            <a:effectRef idx="0">
+              <a:schemeClr val="accent6"/>
+            </a:effectRef>
+            <a:fontRef idx="minor">
+              <a:schemeClr val="lt1"/>
+            </a:fontRef>
+          </p:style>
+          <p:txBody>
+            <a:bodyPr rtlCol="0" anchor="ctr"/>
+            <a:lstStyle/>
+            <a:p>
+              <a:pPr algn="ctr"/>
+              <a:endParaRPr lang="en-US"/>
+            </a:p>
+          </p:txBody>
+        </p:sp>
+        <p:sp>
+          <p:nvSpPr>
+            <p:cNvPr id="69" name="Oval 68"/>
+            <p:cNvSpPr/>
+            <p:nvPr/>
+          </p:nvSpPr>
+          <p:spPr>
+            <a:xfrm>
+              <a:off x="5137573" y="3112347"/>
+              <a:ext cx="155787" cy="155787"/>
+            </a:xfrm>
+            <a:prstGeom prst="ellipse">
+              <a:avLst/>
+            </a:prstGeom>
+          </p:spPr>
+          <p:style>
+            <a:lnRef idx="2">
+              <a:schemeClr val="accent6">
+                <a:shade val="50000"/>
+              </a:schemeClr>
+            </a:lnRef>
+            <a:fillRef idx="1">
+              <a:schemeClr val="accent6"/>
+            </a:fillRef>
+            <a:effectRef idx="0">
+              <a:schemeClr val="accent6"/>
+            </a:effectRef>
+            <a:fontRef idx="minor">
+              <a:schemeClr val="lt1"/>
+            </a:fontRef>
+          </p:style>
+          <p:txBody>
+            <a:bodyPr rtlCol="0" anchor="ctr"/>
+            <a:lstStyle/>
+            <a:p>
+              <a:pPr algn="ctr"/>
+              <a:endParaRPr lang="en-US"/>
+            </a:p>
+          </p:txBody>
+        </p:sp>
+        <p:sp>
+          <p:nvSpPr>
+            <p:cNvPr id="70" name="Oval 69"/>
+            <p:cNvSpPr/>
+            <p:nvPr/>
+          </p:nvSpPr>
+          <p:spPr>
+            <a:xfrm>
+              <a:off x="5289973" y="3264747"/>
+              <a:ext cx="155787" cy="155787"/>
+            </a:xfrm>
+            <a:prstGeom prst="ellipse">
+              <a:avLst/>
+            </a:prstGeom>
+          </p:spPr>
+          <p:style>
+            <a:lnRef idx="2">
+              <a:schemeClr val="accent6">
+                <a:shade val="50000"/>
+              </a:schemeClr>
+            </a:lnRef>
+            <a:fillRef idx="1">
+              <a:schemeClr val="accent6"/>
+            </a:fillRef>
+            <a:effectRef idx="0">
+              <a:schemeClr val="accent6"/>
+            </a:effectRef>
+            <a:fontRef idx="minor">
+              <a:schemeClr val="lt1"/>
+            </a:fontRef>
+          </p:style>
+          <p:txBody>
+            <a:bodyPr rtlCol="0" anchor="ctr"/>
+            <a:lstStyle/>
+            <a:p>
+              <a:pPr algn="ctr"/>
+              <a:endParaRPr lang="en-US"/>
+            </a:p>
+          </p:txBody>
+        </p:sp>
+        <p:sp>
+          <p:nvSpPr>
+            <p:cNvPr id="71" name="Oval 70"/>
+            <p:cNvSpPr/>
+            <p:nvPr/>
+          </p:nvSpPr>
+          <p:spPr>
+            <a:xfrm>
+              <a:off x="4718409" y="3261360"/>
+              <a:ext cx="155787" cy="155787"/>
+            </a:xfrm>
+            <a:prstGeom prst="ellipse">
+              <a:avLst/>
+            </a:prstGeom>
+          </p:spPr>
+          <p:style>
+            <a:lnRef idx="2">
+              <a:schemeClr val="accent6">
+                <a:shade val="50000"/>
+              </a:schemeClr>
+            </a:lnRef>
+            <a:fillRef idx="1">
+              <a:schemeClr val="accent6"/>
+            </a:fillRef>
+            <a:effectRef idx="0">
+              <a:schemeClr val="accent6"/>
+            </a:effectRef>
+            <a:fontRef idx="minor">
+              <a:schemeClr val="lt1"/>
+            </a:fontRef>
+          </p:style>
+          <p:txBody>
+            <a:bodyPr rtlCol="0" anchor="ctr"/>
+            <a:lstStyle/>
+            <a:p>
+              <a:pPr algn="ctr"/>
+              <a:endParaRPr lang="en-US"/>
+            </a:p>
+          </p:txBody>
+        </p:sp>
+        <p:sp>
+          <p:nvSpPr>
+            <p:cNvPr id="72" name="Oval 71"/>
+            <p:cNvSpPr/>
+            <p:nvPr/>
+          </p:nvSpPr>
+          <p:spPr>
+            <a:xfrm>
+              <a:off x="4934373" y="3362960"/>
+              <a:ext cx="155787" cy="155787"/>
+            </a:xfrm>
+            <a:prstGeom prst="ellipse">
+              <a:avLst/>
+            </a:prstGeom>
+          </p:spPr>
+          <p:style>
+            <a:lnRef idx="2">
+              <a:schemeClr val="accent6">
+                <a:shade val="50000"/>
+              </a:schemeClr>
+            </a:lnRef>
+            <a:fillRef idx="1">
+              <a:schemeClr val="accent6"/>
+            </a:fillRef>
+            <a:effectRef idx="0">
+              <a:schemeClr val="accent6"/>
+            </a:effectRef>
+            <a:fontRef idx="minor">
+              <a:schemeClr val="lt1"/>
+            </a:fontRef>
+          </p:style>
+          <p:txBody>
+            <a:bodyPr rtlCol="0" anchor="ctr"/>
+            <a:lstStyle/>
+            <a:p>
+              <a:pPr algn="ctr"/>
+              <a:endParaRPr lang="en-US"/>
+            </a:p>
+          </p:txBody>
+        </p:sp>
+        <p:sp>
+          <p:nvSpPr>
+            <p:cNvPr id="73" name="Oval 72"/>
+            <p:cNvSpPr/>
+            <p:nvPr/>
+          </p:nvSpPr>
+          <p:spPr>
+            <a:xfrm>
+              <a:off x="5112173" y="3501162"/>
+              <a:ext cx="155787" cy="155787"/>
+            </a:xfrm>
+            <a:prstGeom prst="ellipse">
+              <a:avLst/>
+            </a:prstGeom>
+          </p:spPr>
+          <p:style>
+            <a:lnRef idx="2">
+              <a:schemeClr val="accent6">
+                <a:shade val="50000"/>
+              </a:schemeClr>
+            </a:lnRef>
+            <a:fillRef idx="1">
+              <a:schemeClr val="accent6"/>
+            </a:fillRef>
+            <a:effectRef idx="0">
+              <a:schemeClr val="accent6"/>
+            </a:effectRef>
+            <a:fontRef idx="minor">
+              <a:schemeClr val="lt1"/>
+            </a:fontRef>
+          </p:style>
+          <p:txBody>
+            <a:bodyPr rtlCol="0" anchor="ctr"/>
+            <a:lstStyle/>
+            <a:p>
+              <a:pPr algn="ctr"/>
+              <a:endParaRPr lang="en-US"/>
+            </a:p>
+          </p:txBody>
+        </p:sp>
+      </p:grpSp>
+      <p:grpSp>
+        <p:nvGrpSpPr>
+          <p:cNvPr id="74" name="Group 73"/>
+          <p:cNvGrpSpPr/>
+          <p:nvPr/>
+        </p:nvGrpSpPr>
+        <p:grpSpPr>
+          <a:xfrm>
+            <a:off x="6622046" y="3349119"/>
+            <a:ext cx="1012873" cy="1012873"/>
+            <a:chOff x="4543864" y="2855742"/>
+            <a:chExt cx="1012873" cy="1012873"/>
+          </a:xfrm>
+        </p:grpSpPr>
+        <p:sp>
+          <p:nvSpPr>
+            <p:cNvPr id="75" name="Oval 74"/>
+            <p:cNvSpPr/>
+            <p:nvPr/>
+          </p:nvSpPr>
+          <p:spPr>
+            <a:xfrm>
+              <a:off x="4543864" y="2855742"/>
+              <a:ext cx="1012873" cy="1012873"/>
+            </a:xfrm>
+            <a:prstGeom prst="ellipse">
+              <a:avLst/>
+            </a:prstGeom>
+          </p:spPr>
+          <p:style>
+            <a:lnRef idx="2">
+              <a:schemeClr val="accent4"/>
+            </a:lnRef>
+            <a:fillRef idx="1">
+              <a:schemeClr val="lt1"/>
+            </a:fillRef>
+            <a:effectRef idx="0">
+              <a:schemeClr val="accent4"/>
+            </a:effectRef>
+            <a:fontRef idx="minor">
+              <a:schemeClr val="dk1"/>
+            </a:fontRef>
+          </p:style>
+          <p:txBody>
+            <a:bodyPr rtlCol="0" anchor="ctr"/>
+            <a:lstStyle/>
+            <a:p>
+              <a:pPr algn="ctr"/>
+              <a:endParaRPr lang="en-US"/>
+            </a:p>
+          </p:txBody>
+        </p:sp>
+        <p:sp>
+          <p:nvSpPr>
+            <p:cNvPr id="76" name="Oval 75"/>
+            <p:cNvSpPr/>
+            <p:nvPr/>
+          </p:nvSpPr>
+          <p:spPr>
+            <a:xfrm>
+              <a:off x="4903893" y="3095413"/>
+              <a:ext cx="155787" cy="155787"/>
+            </a:xfrm>
+            <a:prstGeom prst="ellipse">
+              <a:avLst/>
+            </a:prstGeom>
+          </p:spPr>
+          <p:style>
+            <a:lnRef idx="2">
+              <a:schemeClr val="accent6">
+                <a:shade val="50000"/>
+              </a:schemeClr>
+            </a:lnRef>
+            <a:fillRef idx="1">
+              <a:schemeClr val="accent6"/>
+            </a:fillRef>
+            <a:effectRef idx="0">
+              <a:schemeClr val="accent6"/>
+            </a:effectRef>
+            <a:fontRef idx="minor">
+              <a:schemeClr val="lt1"/>
+            </a:fontRef>
+          </p:style>
+          <p:txBody>
+            <a:bodyPr rtlCol="0" anchor="ctr"/>
+            <a:lstStyle/>
+            <a:p>
+              <a:pPr algn="ctr"/>
+              <a:endParaRPr lang="en-US"/>
+            </a:p>
+          </p:txBody>
+        </p:sp>
+        <p:sp>
+          <p:nvSpPr>
+            <p:cNvPr id="77" name="Oval 76"/>
+            <p:cNvSpPr/>
+            <p:nvPr/>
+          </p:nvSpPr>
+          <p:spPr>
+            <a:xfrm>
+              <a:off x="5137573" y="3112347"/>
+              <a:ext cx="155787" cy="155787"/>
+            </a:xfrm>
+            <a:prstGeom prst="ellipse">
+              <a:avLst/>
+            </a:prstGeom>
+          </p:spPr>
+          <p:style>
+            <a:lnRef idx="2">
+              <a:schemeClr val="accent6">
+                <a:shade val="50000"/>
+              </a:schemeClr>
+            </a:lnRef>
+            <a:fillRef idx="1">
+              <a:schemeClr val="accent6"/>
+            </a:fillRef>
+            <a:effectRef idx="0">
+              <a:schemeClr val="accent6"/>
+            </a:effectRef>
+            <a:fontRef idx="minor">
+              <a:schemeClr val="lt1"/>
+            </a:fontRef>
+          </p:style>
+          <p:txBody>
+            <a:bodyPr rtlCol="0" anchor="ctr"/>
+            <a:lstStyle/>
+            <a:p>
+              <a:pPr algn="ctr"/>
+              <a:endParaRPr lang="en-US"/>
+            </a:p>
+          </p:txBody>
+        </p:sp>
+        <p:sp>
+          <p:nvSpPr>
+            <p:cNvPr id="78" name="Oval 77"/>
+            <p:cNvSpPr/>
+            <p:nvPr/>
+          </p:nvSpPr>
+          <p:spPr>
+            <a:xfrm>
+              <a:off x="5289973" y="3264747"/>
+              <a:ext cx="155787" cy="155787"/>
+            </a:xfrm>
+            <a:prstGeom prst="ellipse">
+              <a:avLst/>
+            </a:prstGeom>
+          </p:spPr>
+          <p:style>
+            <a:lnRef idx="2">
+              <a:schemeClr val="accent6">
+                <a:shade val="50000"/>
+              </a:schemeClr>
+            </a:lnRef>
+            <a:fillRef idx="1">
+              <a:schemeClr val="accent6"/>
+            </a:fillRef>
+            <a:effectRef idx="0">
+              <a:schemeClr val="accent6"/>
+            </a:effectRef>
+            <a:fontRef idx="minor">
+              <a:schemeClr val="lt1"/>
+            </a:fontRef>
+          </p:style>
+          <p:txBody>
+            <a:bodyPr rtlCol="0" anchor="ctr"/>
+            <a:lstStyle/>
+            <a:p>
+              <a:pPr algn="ctr"/>
+              <a:endParaRPr lang="en-US"/>
+            </a:p>
+          </p:txBody>
+        </p:sp>
+        <p:sp>
+          <p:nvSpPr>
+            <p:cNvPr id="79" name="Oval 78"/>
+            <p:cNvSpPr/>
+            <p:nvPr/>
+          </p:nvSpPr>
+          <p:spPr>
+            <a:xfrm>
+              <a:off x="4718409" y="3261360"/>
+              <a:ext cx="155787" cy="155787"/>
+            </a:xfrm>
+            <a:prstGeom prst="ellipse">
+              <a:avLst/>
+            </a:prstGeom>
+          </p:spPr>
+          <p:style>
+            <a:lnRef idx="2">
+              <a:schemeClr val="accent6">
+                <a:shade val="50000"/>
+              </a:schemeClr>
+            </a:lnRef>
+            <a:fillRef idx="1">
+              <a:schemeClr val="accent6"/>
+            </a:fillRef>
+            <a:effectRef idx="0">
+              <a:schemeClr val="accent6"/>
+            </a:effectRef>
+            <a:fontRef idx="minor">
+              <a:schemeClr val="lt1"/>
+            </a:fontRef>
+          </p:style>
+          <p:txBody>
+            <a:bodyPr rtlCol="0" anchor="ctr"/>
+            <a:lstStyle/>
+            <a:p>
+              <a:pPr algn="ctr"/>
+              <a:endParaRPr lang="en-US"/>
+            </a:p>
+          </p:txBody>
+        </p:sp>
+        <p:sp>
+          <p:nvSpPr>
+            <p:cNvPr id="80" name="Oval 79"/>
+            <p:cNvSpPr/>
+            <p:nvPr/>
+          </p:nvSpPr>
+          <p:spPr>
+            <a:xfrm>
+              <a:off x="4934373" y="3362960"/>
+              <a:ext cx="155787" cy="155787"/>
+            </a:xfrm>
+            <a:prstGeom prst="ellipse">
+              <a:avLst/>
+            </a:prstGeom>
+          </p:spPr>
+          <p:style>
+            <a:lnRef idx="2">
+              <a:schemeClr val="accent6">
+                <a:shade val="50000"/>
+              </a:schemeClr>
+            </a:lnRef>
+            <a:fillRef idx="1">
+              <a:schemeClr val="accent6"/>
+            </a:fillRef>
+            <a:effectRef idx="0">
+              <a:schemeClr val="accent6"/>
+            </a:effectRef>
+            <a:fontRef idx="minor">
+              <a:schemeClr val="lt1"/>
+            </a:fontRef>
+          </p:style>
+          <p:txBody>
+            <a:bodyPr rtlCol="0" anchor="ctr"/>
+            <a:lstStyle/>
+            <a:p>
+              <a:pPr algn="ctr"/>
+              <a:endParaRPr lang="en-US"/>
+            </a:p>
+          </p:txBody>
+        </p:sp>
+        <p:sp>
+          <p:nvSpPr>
+            <p:cNvPr id="81" name="Oval 80"/>
+            <p:cNvSpPr/>
+            <p:nvPr/>
+          </p:nvSpPr>
+          <p:spPr>
+            <a:xfrm>
+              <a:off x="5112173" y="3501162"/>
+              <a:ext cx="155787" cy="155787"/>
+            </a:xfrm>
+            <a:prstGeom prst="ellipse">
+              <a:avLst/>
+            </a:prstGeom>
+          </p:spPr>
+          <p:style>
+            <a:lnRef idx="2">
+              <a:schemeClr val="accent6">
+                <a:shade val="50000"/>
+              </a:schemeClr>
+            </a:lnRef>
+            <a:fillRef idx="1">
+              <a:schemeClr val="accent6"/>
+            </a:fillRef>
+            <a:effectRef idx="0">
+              <a:schemeClr val="accent6"/>
+            </a:effectRef>
+            <a:fontRef idx="minor">
+              <a:schemeClr val="lt1"/>
+            </a:fontRef>
+          </p:style>
+          <p:txBody>
+            <a:bodyPr rtlCol="0" anchor="ctr"/>
+            <a:lstStyle/>
+            <a:p>
+              <a:pPr algn="ctr"/>
+              <a:endParaRPr lang="en-US"/>
+            </a:p>
+          </p:txBody>
+        </p:sp>
+      </p:grpSp>
+      <p:grpSp>
+        <p:nvGrpSpPr>
+          <p:cNvPr id="82" name="Group 81"/>
+          <p:cNvGrpSpPr/>
+          <p:nvPr/>
+        </p:nvGrpSpPr>
+        <p:grpSpPr>
+          <a:xfrm>
+            <a:off x="5296061" y="5164300"/>
+            <a:ext cx="1012873" cy="1012873"/>
+            <a:chOff x="4543864" y="2855742"/>
+            <a:chExt cx="1012873" cy="1012873"/>
+          </a:xfrm>
+        </p:grpSpPr>
+        <p:sp>
+          <p:nvSpPr>
+            <p:cNvPr id="83" name="Oval 82"/>
+            <p:cNvSpPr/>
+            <p:nvPr/>
+          </p:nvSpPr>
+          <p:spPr>
+            <a:xfrm>
+              <a:off x="4543864" y="2855742"/>
+              <a:ext cx="1012873" cy="1012873"/>
+            </a:xfrm>
+            <a:prstGeom prst="ellipse">
+              <a:avLst/>
+            </a:prstGeom>
+          </p:spPr>
+          <p:style>
+            <a:lnRef idx="2">
+              <a:schemeClr val="accent4"/>
+            </a:lnRef>
+            <a:fillRef idx="1">
+              <a:schemeClr val="lt1"/>
+            </a:fillRef>
+            <a:effectRef idx="0">
+              <a:schemeClr val="accent4"/>
+            </a:effectRef>
+            <a:fontRef idx="minor">
+              <a:schemeClr val="dk1"/>
+            </a:fontRef>
+          </p:style>
+          <p:txBody>
+            <a:bodyPr rtlCol="0" anchor="ctr"/>
+            <a:lstStyle/>
+            <a:p>
+              <a:pPr algn="ctr"/>
+              <a:endParaRPr lang="en-US"/>
+            </a:p>
+          </p:txBody>
+        </p:sp>
+        <p:sp>
+          <p:nvSpPr>
+            <p:cNvPr id="84" name="Oval 83"/>
+            <p:cNvSpPr/>
+            <p:nvPr/>
+          </p:nvSpPr>
+          <p:spPr>
+            <a:xfrm>
+              <a:off x="4903893" y="3095413"/>
+              <a:ext cx="155787" cy="155787"/>
+            </a:xfrm>
+            <a:prstGeom prst="ellipse">
+              <a:avLst/>
+            </a:prstGeom>
+          </p:spPr>
+          <p:style>
+            <a:lnRef idx="2">
+              <a:schemeClr val="accent6">
+                <a:shade val="50000"/>
+              </a:schemeClr>
+            </a:lnRef>
+            <a:fillRef idx="1">
+              <a:schemeClr val="accent6"/>
+            </a:fillRef>
+            <a:effectRef idx="0">
+              <a:schemeClr val="accent6"/>
+            </a:effectRef>
+            <a:fontRef idx="minor">
+              <a:schemeClr val="lt1"/>
+            </a:fontRef>
+          </p:style>
+          <p:txBody>
+            <a:bodyPr rtlCol="0" anchor="ctr"/>
+            <a:lstStyle/>
+            <a:p>
+              <a:pPr algn="ctr"/>
+              <a:endParaRPr lang="en-US"/>
+            </a:p>
+          </p:txBody>
+        </p:sp>
+        <p:sp>
+          <p:nvSpPr>
+            <p:cNvPr id="85" name="Oval 84"/>
+            <p:cNvSpPr/>
+            <p:nvPr/>
+          </p:nvSpPr>
+          <p:spPr>
+            <a:xfrm>
+              <a:off x="5137573" y="3112347"/>
+              <a:ext cx="155787" cy="155787"/>
+            </a:xfrm>
+            <a:prstGeom prst="ellipse">
+              <a:avLst/>
+            </a:prstGeom>
+          </p:spPr>
+          <p:style>
+            <a:lnRef idx="2">
+              <a:schemeClr val="accent6">
+                <a:shade val="50000"/>
+              </a:schemeClr>
+            </a:lnRef>
+            <a:fillRef idx="1">
+              <a:schemeClr val="accent6"/>
+            </a:fillRef>
+            <a:effectRef idx="0">
+              <a:schemeClr val="accent6"/>
+            </a:effectRef>
+            <a:fontRef idx="minor">
+              <a:schemeClr val="lt1"/>
+            </a:fontRef>
+          </p:style>
+          <p:txBody>
+            <a:bodyPr rtlCol="0" anchor="ctr"/>
+            <a:lstStyle/>
+            <a:p>
+              <a:pPr algn="ctr"/>
+              <a:endParaRPr lang="en-US"/>
+            </a:p>
+          </p:txBody>
+        </p:sp>
+        <p:sp>
+          <p:nvSpPr>
+            <p:cNvPr id="86" name="Oval 85"/>
+            <p:cNvSpPr/>
+            <p:nvPr/>
+          </p:nvSpPr>
+          <p:spPr>
+            <a:xfrm>
+              <a:off x="5289973" y="3264747"/>
+              <a:ext cx="155787" cy="155787"/>
+            </a:xfrm>
+            <a:prstGeom prst="ellipse">
+              <a:avLst/>
+            </a:prstGeom>
+          </p:spPr>
+          <p:style>
+            <a:lnRef idx="2">
+              <a:schemeClr val="accent6">
+                <a:shade val="50000"/>
+              </a:schemeClr>
+            </a:lnRef>
+            <a:fillRef idx="1">
+              <a:schemeClr val="accent6"/>
+            </a:fillRef>
+            <a:effectRef idx="0">
+              <a:schemeClr val="accent6"/>
+            </a:effectRef>
+            <a:fontRef idx="minor">
+              <a:schemeClr val="lt1"/>
+            </a:fontRef>
+          </p:style>
+          <p:txBody>
+            <a:bodyPr rtlCol="0" anchor="ctr"/>
+            <a:lstStyle/>
+            <a:p>
+              <a:pPr algn="ctr"/>
+              <a:endParaRPr lang="en-US"/>
+            </a:p>
+          </p:txBody>
+        </p:sp>
+        <p:sp>
+          <p:nvSpPr>
+            <p:cNvPr id="87" name="Oval 86"/>
+            <p:cNvSpPr/>
+            <p:nvPr/>
+          </p:nvSpPr>
+          <p:spPr>
+            <a:xfrm>
+              <a:off x="4718409" y="3261360"/>
+              <a:ext cx="155787" cy="155787"/>
+            </a:xfrm>
+            <a:prstGeom prst="ellipse">
+              <a:avLst/>
+            </a:prstGeom>
+          </p:spPr>
+          <p:style>
+            <a:lnRef idx="2">
+              <a:schemeClr val="accent6">
+                <a:shade val="50000"/>
+              </a:schemeClr>
+            </a:lnRef>
+            <a:fillRef idx="1">
+              <a:schemeClr val="accent6"/>
+            </a:fillRef>
+            <a:effectRef idx="0">
+              <a:schemeClr val="accent6"/>
+            </a:effectRef>
+            <a:fontRef idx="minor">
+              <a:schemeClr val="lt1"/>
+            </a:fontRef>
+          </p:style>
+          <p:txBody>
+            <a:bodyPr rtlCol="0" anchor="ctr"/>
+            <a:lstStyle/>
+            <a:p>
+              <a:pPr algn="ctr"/>
+              <a:endParaRPr lang="en-US"/>
+            </a:p>
+          </p:txBody>
+        </p:sp>
+        <p:sp>
+          <p:nvSpPr>
+            <p:cNvPr id="88" name="Oval 87"/>
+            <p:cNvSpPr/>
+            <p:nvPr/>
+          </p:nvSpPr>
+          <p:spPr>
+            <a:xfrm>
+              <a:off x="4934373" y="3362960"/>
+              <a:ext cx="155787" cy="155787"/>
+            </a:xfrm>
+            <a:prstGeom prst="ellipse">
+              <a:avLst/>
+            </a:prstGeom>
+          </p:spPr>
+          <p:style>
+            <a:lnRef idx="2">
+              <a:schemeClr val="accent6">
+                <a:shade val="50000"/>
+              </a:schemeClr>
+            </a:lnRef>
+            <a:fillRef idx="1">
+              <a:schemeClr val="accent6"/>
+            </a:fillRef>
+            <a:effectRef idx="0">
+              <a:schemeClr val="accent6"/>
+            </a:effectRef>
+            <a:fontRef idx="minor">
+              <a:schemeClr val="lt1"/>
+            </a:fontRef>
+          </p:style>
+          <p:txBody>
+            <a:bodyPr rtlCol="0" anchor="ctr"/>
+            <a:lstStyle/>
+            <a:p>
+              <a:pPr algn="ctr"/>
+              <a:endParaRPr lang="en-US"/>
+            </a:p>
+          </p:txBody>
+        </p:sp>
+        <p:sp>
+          <p:nvSpPr>
+            <p:cNvPr id="89" name="Oval 88"/>
+            <p:cNvSpPr/>
+            <p:nvPr/>
+          </p:nvSpPr>
+          <p:spPr>
+            <a:xfrm>
+              <a:off x="5112173" y="3501162"/>
+              <a:ext cx="155787" cy="155787"/>
+            </a:xfrm>
+            <a:prstGeom prst="ellipse">
+              <a:avLst/>
+            </a:prstGeom>
+          </p:spPr>
+          <p:style>
+            <a:lnRef idx="2">
+              <a:schemeClr val="accent6">
+                <a:shade val="50000"/>
+              </a:schemeClr>
+            </a:lnRef>
+            <a:fillRef idx="1">
+              <a:schemeClr val="accent6"/>
+            </a:fillRef>
+            <a:effectRef idx="0">
+              <a:schemeClr val="accent6"/>
+            </a:effectRef>
+            <a:fontRef idx="minor">
+              <a:schemeClr val="lt1"/>
+            </a:fontRef>
+          </p:style>
+          <p:txBody>
+            <a:bodyPr rtlCol="0" anchor="ctr"/>
+            <a:lstStyle/>
+            <a:p>
+              <a:pPr algn="ctr"/>
+              <a:endParaRPr lang="en-US"/>
+            </a:p>
+          </p:txBody>
+        </p:sp>
+      </p:grpSp>
+    </p:spTree>
+    <p:extLst>
+      <p:ext uri="{BB962C8B-B14F-4D97-AF65-F5344CB8AC3E}">
+        <p14:creationId xmlns:p14="http://schemas.microsoft.com/office/powerpoint/2010/main" val="1775687898"/>
+      </p:ext>
+    </p:extLst>
+  </p:cSld>
+  <p:clrMapOvr>
+    <a:masterClrMapping/>
+  </p:clrMapOvr>
+</p:sld>
+</file>
+
+<file path=ppt/slides/slide6.xml><?xml version="1.0" encoding="utf-8"?>
+<p:sld xmlns:a="http://schemas.openxmlformats.org/drawingml/2006/main" xmlns:r="http://schemas.openxmlformats.org/officeDocument/2006/relationships" xmlns:p="http://schemas.openxmlformats.org/presentationml/2006/main">
+  <p:cSld>
+    <p:spTree>
+      <p:nvGrpSpPr>
+        <p:cNvPr id="1" name=""/>
+        <p:cNvGrpSpPr/>
+        <p:nvPr/>
+      </p:nvGrpSpPr>
+      <p:grpSpPr>
+        <a:xfrm>
+          <a:off x="0" y="0"/>
+          <a:ext cx="0" cy="0"/>
+          <a:chOff x="0" y="0"/>
+          <a:chExt cx="0" cy="0"/>
+        </a:xfrm>
+      </p:grpSpPr>
+      <p:sp>
+        <p:nvSpPr>
+          <p:cNvPr id="79" name="Rectangle 78"/>
+          <p:cNvSpPr/>
+          <p:nvPr/>
+        </p:nvSpPr>
+        <p:spPr>
+          <a:xfrm>
+            <a:off x="2468880" y="2648849"/>
+            <a:ext cx="2958752" cy="1224700"/>
+          </a:xfrm>
+          <a:prstGeom prst="rect">
+            <a:avLst/>
+          </a:prstGeom>
+          <a:noFill/>
+          <a:ln>
+            <a:prstDash val="dash"/>
+          </a:ln>
+        </p:spPr>
+        <p:style>
+          <a:lnRef idx="2">
+            <a:schemeClr val="accent3">
+              <a:shade val="50000"/>
+            </a:schemeClr>
+          </a:lnRef>
+          <a:fillRef idx="1">
+            <a:schemeClr val="accent3"/>
+          </a:fillRef>
+          <a:effectRef idx="0">
+            <a:schemeClr val="accent3"/>
+          </a:effectRef>
+          <a:fontRef idx="minor">
+            <a:schemeClr val="lt1"/>
+          </a:fontRef>
+        </p:style>
+        <p:txBody>
+          <a:bodyPr rtlCol="0" anchor="ctr"/>
+          <a:lstStyle/>
+          <a:p>
+            <a:pPr algn="ctr"/>
+            <a:endParaRPr lang="en-US"/>
+          </a:p>
+        </p:txBody>
+      </p:sp>
+      <p:sp>
+        <p:nvSpPr>
+          <p:cNvPr id="2" name="Title 1"/>
+          <p:cNvSpPr>
+            <a:spLocks noGrp="1"/>
+          </p:cNvSpPr>
+          <p:nvPr>
+            <p:ph type="title"/>
+          </p:nvPr>
+        </p:nvSpPr>
+        <p:spPr/>
+        <p:txBody>
+          <a:bodyPr/>
+          <a:lstStyle/>
+          <a:p>
+            <a:r>
+              <a:rPr lang="en-US" altLang="zh-CN" dirty="0" smtClean="0"/>
+              <a:t>Storage</a:t>
+            </a:r>
+            <a:r>
+              <a:rPr lang="zh-CN" altLang="en-US" dirty="0" smtClean="0"/>
+              <a:t> </a:t>
+            </a:r>
+            <a:r>
+              <a:rPr lang="en-US" altLang="zh-CN" dirty="0"/>
+              <a:t>Engine</a:t>
+            </a:r>
+            <a:r>
+              <a:rPr lang="zh-CN" altLang="en-US" dirty="0"/>
+              <a:t> </a:t>
+            </a:r>
+            <a:r>
+              <a:rPr lang="en-US" altLang="zh-CN" dirty="0"/>
+              <a:t>Collection</a:t>
+            </a:r>
+            <a:r>
+              <a:rPr lang="zh-CN" altLang="en-US" dirty="0"/>
+              <a:t> </a:t>
+            </a:r>
+            <a:r>
+              <a:rPr lang="en-US" altLang="zh-CN" dirty="0"/>
+              <a:t>Data</a:t>
+            </a:r>
+            <a:r>
+              <a:rPr lang="zh-CN" altLang="en-US" dirty="0"/>
+              <a:t> </a:t>
+            </a:r>
+            <a:r>
+              <a:rPr lang="en-US" altLang="zh-CN" dirty="0" smtClean="0"/>
+              <a:t>Model</a:t>
+            </a:r>
+            <a:endParaRPr lang="en-US" dirty="0"/>
+          </a:p>
+        </p:txBody>
+      </p:sp>
+      <p:grpSp>
+        <p:nvGrpSpPr>
+          <p:cNvPr id="70" name="Group 69"/>
+          <p:cNvGrpSpPr/>
+          <p:nvPr/>
+        </p:nvGrpSpPr>
+        <p:grpSpPr>
+          <a:xfrm>
+            <a:off x="5893981" y="2648850"/>
+            <a:ext cx="2917371" cy="1224699"/>
+            <a:chOff x="6085367" y="3549181"/>
+            <a:chExt cx="2917371" cy="1224699"/>
+          </a:xfrm>
+        </p:grpSpPr>
+        <p:sp>
+          <p:nvSpPr>
+            <p:cNvPr id="5" name="Rounded Rectangle 4"/>
+            <p:cNvSpPr/>
+            <p:nvPr/>
+          </p:nvSpPr>
+          <p:spPr>
+            <a:xfrm>
+              <a:off x="6085367" y="3549181"/>
+              <a:ext cx="2917371" cy="1224699"/>
+            </a:xfrm>
+            <a:prstGeom prst="roundRect">
+              <a:avLst/>
+            </a:prstGeom>
+          </p:spPr>
+          <p:style>
+            <a:lnRef idx="2">
+              <a:schemeClr val="accent1">
+                <a:shade val="50000"/>
+              </a:schemeClr>
+            </a:lnRef>
+            <a:fillRef idx="1">
+              <a:schemeClr val="accent1"/>
+            </a:fillRef>
+            <a:effectRef idx="0">
+              <a:schemeClr val="accent1"/>
+            </a:effectRef>
+            <a:fontRef idx="minor">
+              <a:schemeClr val="lt1"/>
+            </a:fontRef>
+          </p:style>
+          <p:txBody>
+            <a:bodyPr rtlCol="0" anchor="ctr"/>
+            <a:lstStyle/>
+            <a:p>
+              <a:pPr algn="ctr"/>
+              <a:endParaRPr lang="en-US"/>
+            </a:p>
+          </p:txBody>
+        </p:sp>
+        <p:grpSp>
+          <p:nvGrpSpPr>
+            <p:cNvPr id="10" name="Group 9"/>
+            <p:cNvGrpSpPr/>
+            <p:nvPr/>
+          </p:nvGrpSpPr>
+          <p:grpSpPr>
+            <a:xfrm>
+              <a:off x="8519643" y="4587724"/>
+              <a:ext cx="310025" cy="45719"/>
+              <a:chOff x="5940987" y="1815298"/>
+              <a:chExt cx="310025" cy="45719"/>
+            </a:xfrm>
+          </p:grpSpPr>
+          <p:sp>
+            <p:nvSpPr>
+              <p:cNvPr id="11" name="Oval 10"/>
+              <p:cNvSpPr/>
+              <p:nvPr/>
+            </p:nvSpPr>
+            <p:spPr>
+              <a:xfrm>
+                <a:off x="5940987" y="1815298"/>
+                <a:ext cx="47027" cy="45719"/>
+              </a:xfrm>
+              <a:prstGeom prst="ellipse">
+                <a:avLst/>
+              </a:prstGeom>
+              <a:solidFill>
+                <a:schemeClr val="tx1"/>
+              </a:solidFill>
+              <a:effectLst>
+                <a:softEdge rad="12700"/>
+              </a:effectLst>
+            </p:spPr>
+            <p:style>
+              <a:lnRef idx="2">
+                <a:schemeClr val="dk1">
+                  <a:shade val="50000"/>
+                </a:schemeClr>
+              </a:lnRef>
+              <a:fillRef idx="1">
+                <a:schemeClr val="dk1"/>
+              </a:fillRef>
+              <a:effectRef idx="0">
+                <a:schemeClr val="dk1"/>
+              </a:effectRef>
+              <a:fontRef idx="minor">
+                <a:schemeClr val="lt1"/>
+              </a:fontRef>
+            </p:style>
+            <p:txBody>
+              <a:bodyPr rtlCol="0" anchor="ctr"/>
+              <a:lstStyle/>
+              <a:p>
+                <a:pPr algn="ctr"/>
+                <a:endParaRPr lang="en-US"/>
+              </a:p>
+            </p:txBody>
+          </p:sp>
+          <p:sp>
+            <p:nvSpPr>
+              <p:cNvPr id="12" name="Oval 11"/>
+              <p:cNvSpPr/>
+              <p:nvPr/>
+            </p:nvSpPr>
+            <p:spPr>
+              <a:xfrm>
+                <a:off x="6072486" y="1815298"/>
+                <a:ext cx="47027" cy="45719"/>
+              </a:xfrm>
+              <a:prstGeom prst="ellipse">
+                <a:avLst/>
+              </a:prstGeom>
+              <a:solidFill>
+                <a:schemeClr val="tx1"/>
+              </a:solidFill>
+              <a:effectLst>
+                <a:softEdge rad="12700"/>
+              </a:effectLst>
+            </p:spPr>
+            <p:style>
+              <a:lnRef idx="2">
+                <a:schemeClr val="dk1">
+                  <a:shade val="50000"/>
+                </a:schemeClr>
+              </a:lnRef>
+              <a:fillRef idx="1">
+                <a:schemeClr val="dk1"/>
+              </a:fillRef>
+              <a:effectRef idx="0">
+                <a:schemeClr val="dk1"/>
+              </a:effectRef>
+              <a:fontRef idx="minor">
+                <a:schemeClr val="lt1"/>
+              </a:fontRef>
+            </p:style>
+            <p:txBody>
+              <a:bodyPr rtlCol="0" anchor="ctr"/>
+              <a:lstStyle/>
+              <a:p>
+                <a:pPr algn="ctr"/>
+                <a:endParaRPr lang="en-US"/>
+              </a:p>
+            </p:txBody>
+          </p:sp>
+          <p:sp>
+            <p:nvSpPr>
+              <p:cNvPr id="13" name="Oval 12"/>
+              <p:cNvSpPr/>
+              <p:nvPr/>
+            </p:nvSpPr>
+            <p:spPr>
+              <a:xfrm>
+                <a:off x="6203985" y="1815298"/>
+                <a:ext cx="47027" cy="45719"/>
+              </a:xfrm>
+              <a:prstGeom prst="ellipse">
+                <a:avLst/>
+              </a:prstGeom>
+              <a:solidFill>
+                <a:schemeClr val="tx1"/>
+              </a:solidFill>
+              <a:effectLst>
+                <a:softEdge rad="12700"/>
+              </a:effectLst>
+            </p:spPr>
+            <p:style>
+              <a:lnRef idx="2">
+                <a:schemeClr val="dk1">
+                  <a:shade val="50000"/>
+                </a:schemeClr>
+              </a:lnRef>
+              <a:fillRef idx="1">
+                <a:schemeClr val="dk1"/>
+              </a:fillRef>
+              <a:effectRef idx="0">
+                <a:schemeClr val="dk1"/>
+              </a:effectRef>
+              <a:fontRef idx="minor">
+                <a:schemeClr val="lt1"/>
+              </a:fontRef>
+            </p:style>
+            <p:txBody>
+              <a:bodyPr rtlCol="0" anchor="ctr"/>
+              <a:lstStyle/>
+              <a:p>
+                <a:pPr algn="ctr"/>
+                <a:endParaRPr lang="en-US"/>
+              </a:p>
+            </p:txBody>
+          </p:sp>
+        </p:grpSp>
+        <p:grpSp>
+          <p:nvGrpSpPr>
+            <p:cNvPr id="41" name="Group 40"/>
+            <p:cNvGrpSpPr/>
+            <p:nvPr/>
+          </p:nvGrpSpPr>
+          <p:grpSpPr>
+            <a:xfrm>
+              <a:off x="6241355" y="3678629"/>
+              <a:ext cx="2588344" cy="114531"/>
+              <a:chOff x="6241355" y="3678629"/>
+              <a:chExt cx="2588344" cy="114531"/>
+            </a:xfrm>
+          </p:grpSpPr>
+          <p:sp>
+            <p:nvSpPr>
+              <p:cNvPr id="6" name="Rectangle 5"/>
+              <p:cNvSpPr/>
+              <p:nvPr/>
+            </p:nvSpPr>
+            <p:spPr>
+              <a:xfrm>
+                <a:off x="6241355" y="3678629"/>
+                <a:ext cx="310056" cy="114531"/>
+              </a:xfrm>
+              <a:prstGeom prst="rect">
+                <a:avLst/>
+              </a:prstGeom>
+              <a:ln w="28575"/>
+              <a:effectLst/>
+            </p:spPr>
+            <p:style>
+              <a:lnRef idx="2">
+                <a:schemeClr val="accent6">
+                  <a:shade val="50000"/>
+                </a:schemeClr>
+              </a:lnRef>
+              <a:fillRef idx="1">
+                <a:schemeClr val="accent6"/>
+              </a:fillRef>
+              <a:effectRef idx="0">
+                <a:schemeClr val="accent6"/>
+              </a:effectRef>
+              <a:fontRef idx="minor">
+                <a:schemeClr val="lt1"/>
+              </a:fontRef>
+            </p:style>
+            <p:txBody>
+              <a:bodyPr rtlCol="0" anchor="ctr"/>
+              <a:lstStyle/>
+              <a:p>
+                <a:pPr algn="ctr"/>
+                <a:endParaRPr lang="en-US"/>
+              </a:p>
+            </p:txBody>
+          </p:sp>
+          <p:sp>
+            <p:nvSpPr>
+              <p:cNvPr id="7" name="Rectangle 6"/>
+              <p:cNvSpPr/>
+              <p:nvPr/>
+            </p:nvSpPr>
+            <p:spPr>
+              <a:xfrm>
+                <a:off x="6697013" y="3678629"/>
+                <a:ext cx="310056" cy="114531"/>
+              </a:xfrm>
+              <a:prstGeom prst="rect">
+                <a:avLst/>
+              </a:prstGeom>
+              <a:ln w="28575"/>
+              <a:effectLst/>
+            </p:spPr>
+            <p:style>
+              <a:lnRef idx="2">
+                <a:schemeClr val="accent6">
+                  <a:shade val="50000"/>
+                </a:schemeClr>
+              </a:lnRef>
+              <a:fillRef idx="1">
+                <a:schemeClr val="accent6"/>
+              </a:fillRef>
+              <a:effectRef idx="0">
+                <a:schemeClr val="accent6"/>
+              </a:effectRef>
+              <a:fontRef idx="minor">
+                <a:schemeClr val="lt1"/>
+              </a:fontRef>
+            </p:style>
+            <p:txBody>
+              <a:bodyPr rtlCol="0" anchor="ctr"/>
+              <a:lstStyle/>
+              <a:p>
+                <a:pPr algn="ctr"/>
+                <a:endParaRPr lang="en-US"/>
+              </a:p>
+            </p:txBody>
+          </p:sp>
+          <p:sp>
+            <p:nvSpPr>
+              <p:cNvPr id="8" name="Rectangle 7"/>
+              <p:cNvSpPr/>
+              <p:nvPr/>
+            </p:nvSpPr>
+            <p:spPr>
+              <a:xfrm>
+                <a:off x="7152671" y="3678629"/>
+                <a:ext cx="310056" cy="114531"/>
+              </a:xfrm>
+              <a:prstGeom prst="rect">
+                <a:avLst/>
+              </a:prstGeom>
+              <a:ln w="28575"/>
+              <a:effectLst/>
+            </p:spPr>
+            <p:style>
+              <a:lnRef idx="2">
+                <a:schemeClr val="accent6">
+                  <a:shade val="50000"/>
+                </a:schemeClr>
+              </a:lnRef>
+              <a:fillRef idx="1">
+                <a:schemeClr val="accent6"/>
+              </a:fillRef>
+              <a:effectRef idx="0">
+                <a:schemeClr val="accent6"/>
+              </a:effectRef>
+              <a:fontRef idx="minor">
+                <a:schemeClr val="lt1"/>
+              </a:fontRef>
+            </p:style>
+            <p:txBody>
+              <a:bodyPr rtlCol="0" anchor="ctr"/>
+              <a:lstStyle/>
+              <a:p>
+                <a:pPr algn="ctr"/>
+                <a:endParaRPr lang="en-US"/>
+              </a:p>
+            </p:txBody>
+          </p:sp>
+          <p:sp>
+            <p:nvSpPr>
+              <p:cNvPr id="14" name="Rectangle 13"/>
+              <p:cNvSpPr/>
+              <p:nvPr/>
+            </p:nvSpPr>
+            <p:spPr>
+              <a:xfrm>
+                <a:off x="7608329" y="3678629"/>
+                <a:ext cx="310056" cy="114531"/>
+              </a:xfrm>
+              <a:prstGeom prst="rect">
+                <a:avLst/>
+              </a:prstGeom>
+              <a:ln w="28575"/>
+              <a:effectLst/>
+            </p:spPr>
+            <p:style>
+              <a:lnRef idx="2">
+                <a:schemeClr val="accent6">
+                  <a:shade val="50000"/>
+                </a:schemeClr>
+              </a:lnRef>
+              <a:fillRef idx="1">
+                <a:schemeClr val="accent6"/>
+              </a:fillRef>
+              <a:effectRef idx="0">
+                <a:schemeClr val="accent6"/>
+              </a:effectRef>
+              <a:fontRef idx="minor">
+                <a:schemeClr val="lt1"/>
+              </a:fontRef>
+            </p:style>
+            <p:txBody>
+              <a:bodyPr rtlCol="0" anchor="ctr"/>
+              <a:lstStyle/>
+              <a:p>
+                <a:pPr algn="ctr"/>
+                <a:endParaRPr lang="en-US"/>
+              </a:p>
+            </p:txBody>
+          </p:sp>
+          <p:sp>
+            <p:nvSpPr>
+              <p:cNvPr id="15" name="Rectangle 14"/>
+              <p:cNvSpPr/>
+              <p:nvPr/>
+            </p:nvSpPr>
+            <p:spPr>
+              <a:xfrm>
+                <a:off x="8063987" y="3678629"/>
+                <a:ext cx="310056" cy="114531"/>
+              </a:xfrm>
+              <a:prstGeom prst="rect">
+                <a:avLst/>
+              </a:prstGeom>
+              <a:ln w="28575"/>
+              <a:effectLst/>
+            </p:spPr>
+            <p:style>
+              <a:lnRef idx="2">
+                <a:schemeClr val="accent6">
+                  <a:shade val="50000"/>
+                </a:schemeClr>
+              </a:lnRef>
+              <a:fillRef idx="1">
+                <a:schemeClr val="accent6"/>
+              </a:fillRef>
+              <a:effectRef idx="0">
+                <a:schemeClr val="accent6"/>
+              </a:effectRef>
+              <a:fontRef idx="minor">
+                <a:schemeClr val="lt1"/>
+              </a:fontRef>
+            </p:style>
+            <p:txBody>
+              <a:bodyPr rtlCol="0" anchor="ctr"/>
+              <a:lstStyle/>
+              <a:p>
+                <a:pPr algn="ctr"/>
+                <a:endParaRPr lang="en-US"/>
+              </a:p>
+            </p:txBody>
+          </p:sp>
+          <p:sp>
+            <p:nvSpPr>
+              <p:cNvPr id="16" name="Rectangle 15"/>
+              <p:cNvSpPr/>
+              <p:nvPr/>
+            </p:nvSpPr>
+            <p:spPr>
+              <a:xfrm>
+                <a:off x="8519643" y="3678629"/>
+                <a:ext cx="310056" cy="114531"/>
+              </a:xfrm>
+              <a:prstGeom prst="rect">
+                <a:avLst/>
+              </a:prstGeom>
+              <a:ln w="28575"/>
+              <a:effectLst/>
+            </p:spPr>
+            <p:style>
+              <a:lnRef idx="2">
+                <a:schemeClr val="accent6">
+                  <a:shade val="50000"/>
+                </a:schemeClr>
+              </a:lnRef>
+              <a:fillRef idx="1">
+                <a:schemeClr val="accent6"/>
+              </a:fillRef>
+              <a:effectRef idx="0">
+                <a:schemeClr val="accent6"/>
+              </a:effectRef>
+              <a:fontRef idx="minor">
+                <a:schemeClr val="lt1"/>
+              </a:fontRef>
+            </p:style>
+            <p:txBody>
+              <a:bodyPr rtlCol="0" anchor="ctr"/>
+              <a:lstStyle/>
+              <a:p>
+                <a:pPr algn="ctr"/>
+                <a:endParaRPr lang="en-US"/>
+              </a:p>
+            </p:txBody>
+          </p:sp>
+        </p:grpSp>
+        <p:grpSp>
+          <p:nvGrpSpPr>
+            <p:cNvPr id="42" name="Group 41"/>
+            <p:cNvGrpSpPr/>
+            <p:nvPr/>
+          </p:nvGrpSpPr>
+          <p:grpSpPr>
+            <a:xfrm>
+              <a:off x="6241355" y="3888700"/>
+              <a:ext cx="2588344" cy="114531"/>
+              <a:chOff x="6241355" y="3931920"/>
+              <a:chExt cx="2588344" cy="114531"/>
+            </a:xfrm>
+          </p:grpSpPr>
+          <p:sp>
+            <p:nvSpPr>
+              <p:cNvPr id="17" name="Rectangle 16"/>
+              <p:cNvSpPr/>
+              <p:nvPr/>
+            </p:nvSpPr>
+            <p:spPr>
+              <a:xfrm>
+                <a:off x="6241355" y="3931920"/>
+                <a:ext cx="310056" cy="114531"/>
+              </a:xfrm>
+              <a:prstGeom prst="rect">
+                <a:avLst/>
+              </a:prstGeom>
+              <a:ln w="28575"/>
+              <a:effectLst/>
+            </p:spPr>
+            <p:style>
+              <a:lnRef idx="2">
+                <a:schemeClr val="accent6">
+                  <a:shade val="50000"/>
+                </a:schemeClr>
+              </a:lnRef>
+              <a:fillRef idx="1">
+                <a:schemeClr val="accent6"/>
+              </a:fillRef>
+              <a:effectRef idx="0">
+                <a:schemeClr val="accent6"/>
+              </a:effectRef>
+              <a:fontRef idx="minor">
+                <a:schemeClr val="lt1"/>
+              </a:fontRef>
+            </p:style>
+            <p:txBody>
+              <a:bodyPr rtlCol="0" anchor="ctr"/>
+              <a:lstStyle/>
+              <a:p>
+                <a:pPr algn="ctr"/>
+                <a:endParaRPr lang="en-US"/>
+              </a:p>
+            </p:txBody>
+          </p:sp>
+          <p:sp>
+            <p:nvSpPr>
+              <p:cNvPr id="18" name="Rectangle 17"/>
+              <p:cNvSpPr/>
+              <p:nvPr/>
+            </p:nvSpPr>
+            <p:spPr>
+              <a:xfrm>
+                <a:off x="6697013" y="3931920"/>
+                <a:ext cx="310056" cy="114531"/>
+              </a:xfrm>
+              <a:prstGeom prst="rect">
+                <a:avLst/>
+              </a:prstGeom>
+              <a:ln w="28575"/>
+              <a:effectLst/>
+            </p:spPr>
+            <p:style>
+              <a:lnRef idx="2">
+                <a:schemeClr val="accent6">
+                  <a:shade val="50000"/>
+                </a:schemeClr>
+              </a:lnRef>
+              <a:fillRef idx="1">
+                <a:schemeClr val="accent6"/>
+              </a:fillRef>
+              <a:effectRef idx="0">
+                <a:schemeClr val="accent6"/>
+              </a:effectRef>
+              <a:fontRef idx="minor">
+                <a:schemeClr val="lt1"/>
+              </a:fontRef>
+            </p:style>
+            <p:txBody>
+              <a:bodyPr rtlCol="0" anchor="ctr"/>
+              <a:lstStyle/>
+              <a:p>
+                <a:pPr algn="ctr"/>
+                <a:endParaRPr lang="en-US"/>
+              </a:p>
+            </p:txBody>
+          </p:sp>
+          <p:sp>
+            <p:nvSpPr>
+              <p:cNvPr id="19" name="Rectangle 18"/>
+              <p:cNvSpPr/>
+              <p:nvPr/>
+            </p:nvSpPr>
+            <p:spPr>
+              <a:xfrm>
+                <a:off x="7152671" y="3931920"/>
+                <a:ext cx="310056" cy="114531"/>
+              </a:xfrm>
+              <a:prstGeom prst="rect">
+                <a:avLst/>
+              </a:prstGeom>
+              <a:ln w="28575"/>
+              <a:effectLst/>
+            </p:spPr>
+            <p:style>
+              <a:lnRef idx="2">
+                <a:schemeClr val="accent6">
+                  <a:shade val="50000"/>
+                </a:schemeClr>
+              </a:lnRef>
+              <a:fillRef idx="1">
+                <a:schemeClr val="accent6"/>
+              </a:fillRef>
+              <a:effectRef idx="0">
+                <a:schemeClr val="accent6"/>
+              </a:effectRef>
+              <a:fontRef idx="minor">
+                <a:schemeClr val="lt1"/>
+              </a:fontRef>
+            </p:style>
+            <p:txBody>
+              <a:bodyPr rtlCol="0" anchor="ctr"/>
+              <a:lstStyle/>
+              <a:p>
+                <a:pPr algn="ctr"/>
+                <a:endParaRPr lang="en-US"/>
+              </a:p>
+            </p:txBody>
+          </p:sp>
+          <p:sp>
+            <p:nvSpPr>
+              <p:cNvPr id="20" name="Rectangle 19"/>
+              <p:cNvSpPr/>
+              <p:nvPr/>
+            </p:nvSpPr>
+            <p:spPr>
+              <a:xfrm>
+                <a:off x="7608329" y="3931920"/>
+                <a:ext cx="310056" cy="114531"/>
+              </a:xfrm>
+              <a:prstGeom prst="rect">
+                <a:avLst/>
+              </a:prstGeom>
+              <a:ln w="28575"/>
+              <a:effectLst/>
+            </p:spPr>
+            <p:style>
+              <a:lnRef idx="2">
+                <a:schemeClr val="accent6">
+                  <a:shade val="50000"/>
+                </a:schemeClr>
+              </a:lnRef>
+              <a:fillRef idx="1">
+                <a:schemeClr val="accent6"/>
+              </a:fillRef>
+              <a:effectRef idx="0">
+                <a:schemeClr val="accent6"/>
+              </a:effectRef>
+              <a:fontRef idx="minor">
+                <a:schemeClr val="lt1"/>
+              </a:fontRef>
+            </p:style>
+            <p:txBody>
+              <a:bodyPr rtlCol="0" anchor="ctr"/>
+              <a:lstStyle/>
+              <a:p>
+                <a:pPr algn="ctr"/>
+                <a:endParaRPr lang="en-US"/>
+              </a:p>
+            </p:txBody>
+          </p:sp>
+          <p:sp>
+            <p:nvSpPr>
+              <p:cNvPr id="21" name="Rectangle 20"/>
+              <p:cNvSpPr/>
+              <p:nvPr/>
+            </p:nvSpPr>
+            <p:spPr>
+              <a:xfrm>
+                <a:off x="8063987" y="3931920"/>
+                <a:ext cx="310056" cy="114531"/>
+              </a:xfrm>
+              <a:prstGeom prst="rect">
+                <a:avLst/>
+              </a:prstGeom>
+              <a:ln w="28575"/>
+              <a:effectLst/>
+            </p:spPr>
+            <p:style>
+              <a:lnRef idx="2">
+                <a:schemeClr val="accent6">
+                  <a:shade val="50000"/>
+                </a:schemeClr>
+              </a:lnRef>
+              <a:fillRef idx="1">
+                <a:schemeClr val="accent6"/>
+              </a:fillRef>
+              <a:effectRef idx="0">
+                <a:schemeClr val="accent6"/>
+              </a:effectRef>
+              <a:fontRef idx="minor">
+                <a:schemeClr val="lt1"/>
+              </a:fontRef>
+            </p:style>
+            <p:txBody>
+              <a:bodyPr rtlCol="0" anchor="ctr"/>
+              <a:lstStyle/>
+              <a:p>
+                <a:pPr algn="ctr"/>
+                <a:endParaRPr lang="en-US"/>
+              </a:p>
+            </p:txBody>
+          </p:sp>
+          <p:sp>
+            <p:nvSpPr>
+              <p:cNvPr id="22" name="Rectangle 21"/>
+              <p:cNvSpPr/>
+              <p:nvPr/>
+            </p:nvSpPr>
+            <p:spPr>
+              <a:xfrm>
+                <a:off x="8519643" y="3931920"/>
+                <a:ext cx="310056" cy="114531"/>
+              </a:xfrm>
+              <a:prstGeom prst="rect">
+                <a:avLst/>
+              </a:prstGeom>
+              <a:ln w="28575"/>
+              <a:effectLst/>
+            </p:spPr>
+            <p:style>
+              <a:lnRef idx="2">
+                <a:schemeClr val="accent6">
+                  <a:shade val="50000"/>
+                </a:schemeClr>
+              </a:lnRef>
+              <a:fillRef idx="1">
+                <a:schemeClr val="accent6"/>
+              </a:fillRef>
+              <a:effectRef idx="0">
+                <a:schemeClr val="accent6"/>
+              </a:effectRef>
+              <a:fontRef idx="minor">
+                <a:schemeClr val="lt1"/>
+              </a:fontRef>
+            </p:style>
+            <p:txBody>
+              <a:bodyPr rtlCol="0" anchor="ctr"/>
+              <a:lstStyle/>
+              <a:p>
+                <a:pPr algn="ctr"/>
+                <a:endParaRPr lang="en-US"/>
+              </a:p>
+            </p:txBody>
+          </p:sp>
+        </p:grpSp>
+        <p:grpSp>
+          <p:nvGrpSpPr>
+            <p:cNvPr id="45" name="Group 44"/>
+            <p:cNvGrpSpPr/>
+            <p:nvPr/>
+          </p:nvGrpSpPr>
+          <p:grpSpPr>
+            <a:xfrm>
+              <a:off x="6241324" y="4518912"/>
+              <a:ext cx="2132688" cy="114531"/>
+              <a:chOff x="6241324" y="4518912"/>
+              <a:chExt cx="2132688" cy="114531"/>
+            </a:xfrm>
+          </p:grpSpPr>
+          <p:sp>
+            <p:nvSpPr>
+              <p:cNvPr id="23" name="Rectangle 22"/>
+              <p:cNvSpPr/>
+              <p:nvPr/>
+            </p:nvSpPr>
+            <p:spPr>
+              <a:xfrm>
+                <a:off x="6241324" y="4518912"/>
+                <a:ext cx="310056" cy="114531"/>
+              </a:xfrm>
+              <a:prstGeom prst="rect">
+                <a:avLst/>
+              </a:prstGeom>
+              <a:ln w="28575"/>
+              <a:effectLst/>
+            </p:spPr>
+            <p:style>
+              <a:lnRef idx="2">
+                <a:schemeClr val="accent6">
+                  <a:shade val="50000"/>
+                </a:schemeClr>
+              </a:lnRef>
+              <a:fillRef idx="1">
+                <a:schemeClr val="accent6"/>
+              </a:fillRef>
+              <a:effectRef idx="0">
+                <a:schemeClr val="accent6"/>
+              </a:effectRef>
+              <a:fontRef idx="minor">
+                <a:schemeClr val="lt1"/>
+              </a:fontRef>
+            </p:style>
+            <p:txBody>
+              <a:bodyPr rtlCol="0" anchor="ctr"/>
+              <a:lstStyle/>
+              <a:p>
+                <a:pPr algn="ctr"/>
+                <a:endParaRPr lang="en-US"/>
+              </a:p>
+            </p:txBody>
+          </p:sp>
+          <p:sp>
+            <p:nvSpPr>
+              <p:cNvPr id="24" name="Rectangle 23"/>
+              <p:cNvSpPr/>
+              <p:nvPr/>
+            </p:nvSpPr>
+            <p:spPr>
+              <a:xfrm>
+                <a:off x="6696982" y="4518912"/>
+                <a:ext cx="310056" cy="114531"/>
+              </a:xfrm>
+              <a:prstGeom prst="rect">
+                <a:avLst/>
+              </a:prstGeom>
+              <a:ln w="28575"/>
+              <a:effectLst/>
+            </p:spPr>
+            <p:style>
+              <a:lnRef idx="2">
+                <a:schemeClr val="accent6">
+                  <a:shade val="50000"/>
+                </a:schemeClr>
+              </a:lnRef>
+              <a:fillRef idx="1">
+                <a:schemeClr val="accent6"/>
+              </a:fillRef>
+              <a:effectRef idx="0">
+                <a:schemeClr val="accent6"/>
+              </a:effectRef>
+              <a:fontRef idx="minor">
+                <a:schemeClr val="lt1"/>
+              </a:fontRef>
+            </p:style>
+            <p:txBody>
+              <a:bodyPr rtlCol="0" anchor="ctr"/>
+              <a:lstStyle/>
+              <a:p>
+                <a:pPr algn="ctr"/>
+                <a:endParaRPr lang="en-US"/>
+              </a:p>
+            </p:txBody>
+          </p:sp>
+          <p:sp>
+            <p:nvSpPr>
+              <p:cNvPr id="25" name="Rectangle 24"/>
+              <p:cNvSpPr/>
+              <p:nvPr/>
+            </p:nvSpPr>
+            <p:spPr>
+              <a:xfrm>
+                <a:off x="7152640" y="4518912"/>
+                <a:ext cx="310056" cy="114531"/>
+              </a:xfrm>
+              <a:prstGeom prst="rect">
+                <a:avLst/>
+              </a:prstGeom>
+              <a:ln w="28575"/>
+              <a:effectLst/>
+            </p:spPr>
+            <p:style>
+              <a:lnRef idx="2">
+                <a:schemeClr val="accent6">
+                  <a:shade val="50000"/>
+                </a:schemeClr>
+              </a:lnRef>
+              <a:fillRef idx="1">
+                <a:schemeClr val="accent6"/>
+              </a:fillRef>
+              <a:effectRef idx="0">
+                <a:schemeClr val="accent6"/>
+              </a:effectRef>
+              <a:fontRef idx="minor">
+                <a:schemeClr val="lt1"/>
+              </a:fontRef>
+            </p:style>
+            <p:txBody>
+              <a:bodyPr rtlCol="0" anchor="ctr"/>
+              <a:lstStyle/>
+              <a:p>
+                <a:pPr algn="ctr"/>
+                <a:endParaRPr lang="en-US"/>
+              </a:p>
+            </p:txBody>
+          </p:sp>
+          <p:sp>
+            <p:nvSpPr>
+              <p:cNvPr id="26" name="Rectangle 25"/>
+              <p:cNvSpPr/>
+              <p:nvPr/>
+            </p:nvSpPr>
+            <p:spPr>
+              <a:xfrm>
+                <a:off x="7608298" y="4518912"/>
+                <a:ext cx="310056" cy="114531"/>
+              </a:xfrm>
+              <a:prstGeom prst="rect">
+                <a:avLst/>
+              </a:prstGeom>
+              <a:ln w="28575"/>
+              <a:effectLst/>
+            </p:spPr>
+            <p:style>
+              <a:lnRef idx="2">
+                <a:schemeClr val="accent6">
+                  <a:shade val="50000"/>
+                </a:schemeClr>
+              </a:lnRef>
+              <a:fillRef idx="1">
+                <a:schemeClr val="accent6"/>
+              </a:fillRef>
+              <a:effectRef idx="0">
+                <a:schemeClr val="accent6"/>
+              </a:effectRef>
+              <a:fontRef idx="minor">
+                <a:schemeClr val="lt1"/>
+              </a:fontRef>
+            </p:style>
+            <p:txBody>
+              <a:bodyPr rtlCol="0" anchor="ctr"/>
+              <a:lstStyle/>
+              <a:p>
+                <a:pPr algn="ctr"/>
+                <a:endParaRPr lang="en-US"/>
+              </a:p>
+            </p:txBody>
+          </p:sp>
+          <p:sp>
+            <p:nvSpPr>
+              <p:cNvPr id="27" name="Rectangle 26"/>
+              <p:cNvSpPr/>
+              <p:nvPr/>
+            </p:nvSpPr>
+            <p:spPr>
+              <a:xfrm>
+                <a:off x="8063956" y="4518912"/>
+                <a:ext cx="310056" cy="114531"/>
+              </a:xfrm>
+              <a:prstGeom prst="rect">
+                <a:avLst/>
+              </a:prstGeom>
+              <a:ln w="28575"/>
+              <a:effectLst/>
+            </p:spPr>
+            <p:style>
+              <a:lnRef idx="2">
+                <a:schemeClr val="accent6">
+                  <a:shade val="50000"/>
+                </a:schemeClr>
+              </a:lnRef>
+              <a:fillRef idx="1">
+                <a:schemeClr val="accent6"/>
+              </a:fillRef>
+              <a:effectRef idx="0">
+                <a:schemeClr val="accent6"/>
+              </a:effectRef>
+              <a:fontRef idx="minor">
+                <a:schemeClr val="lt1"/>
+              </a:fontRef>
+            </p:style>
+            <p:txBody>
+              <a:bodyPr rtlCol="0" anchor="ctr"/>
+              <a:lstStyle/>
+              <a:p>
+                <a:pPr algn="ctr"/>
+                <a:endParaRPr lang="en-US"/>
+              </a:p>
+            </p:txBody>
+          </p:sp>
+        </p:grpSp>
+        <p:grpSp>
+          <p:nvGrpSpPr>
+            <p:cNvPr id="43" name="Group 42"/>
+            <p:cNvGrpSpPr/>
+            <p:nvPr/>
+          </p:nvGrpSpPr>
+          <p:grpSpPr>
+            <a:xfrm>
+              <a:off x="6241324" y="4098771"/>
+              <a:ext cx="2588344" cy="114531"/>
+              <a:chOff x="6241324" y="4127945"/>
+              <a:chExt cx="2588344" cy="114531"/>
+            </a:xfrm>
+          </p:grpSpPr>
+          <p:sp>
+            <p:nvSpPr>
+              <p:cNvPr id="29" name="Rectangle 28"/>
+              <p:cNvSpPr/>
+              <p:nvPr/>
+            </p:nvSpPr>
+            <p:spPr>
+              <a:xfrm>
+                <a:off x="6241324" y="4127945"/>
+                <a:ext cx="310056" cy="114531"/>
+              </a:xfrm>
+              <a:prstGeom prst="rect">
+                <a:avLst/>
+              </a:prstGeom>
+              <a:ln w="28575"/>
+              <a:effectLst/>
+            </p:spPr>
+            <p:style>
+              <a:lnRef idx="2">
+                <a:schemeClr val="accent6">
+                  <a:shade val="50000"/>
+                </a:schemeClr>
+              </a:lnRef>
+              <a:fillRef idx="1">
+                <a:schemeClr val="accent6"/>
+              </a:fillRef>
+              <a:effectRef idx="0">
+                <a:schemeClr val="accent6"/>
+              </a:effectRef>
+              <a:fontRef idx="minor">
+                <a:schemeClr val="lt1"/>
+              </a:fontRef>
+            </p:style>
+            <p:txBody>
+              <a:bodyPr rtlCol="0" anchor="ctr"/>
+              <a:lstStyle/>
+              <a:p>
+                <a:pPr algn="ctr"/>
+                <a:endParaRPr lang="en-US"/>
+              </a:p>
+            </p:txBody>
+          </p:sp>
+          <p:sp>
+            <p:nvSpPr>
+              <p:cNvPr id="30" name="Rectangle 29"/>
+              <p:cNvSpPr/>
+              <p:nvPr/>
+            </p:nvSpPr>
+            <p:spPr>
+              <a:xfrm>
+                <a:off x="6696982" y="4127945"/>
+                <a:ext cx="310056" cy="114531"/>
+              </a:xfrm>
+              <a:prstGeom prst="rect">
+                <a:avLst/>
+              </a:prstGeom>
+              <a:ln w="28575"/>
+              <a:effectLst/>
+            </p:spPr>
+            <p:style>
+              <a:lnRef idx="2">
+                <a:schemeClr val="accent6">
+                  <a:shade val="50000"/>
+                </a:schemeClr>
+              </a:lnRef>
+              <a:fillRef idx="1">
+                <a:schemeClr val="accent6"/>
+              </a:fillRef>
+              <a:effectRef idx="0">
+                <a:schemeClr val="accent6"/>
+              </a:effectRef>
+              <a:fontRef idx="minor">
+                <a:schemeClr val="lt1"/>
+              </a:fontRef>
+            </p:style>
+            <p:txBody>
+              <a:bodyPr rtlCol="0" anchor="ctr"/>
+              <a:lstStyle/>
+              <a:p>
+                <a:pPr algn="ctr"/>
+                <a:endParaRPr lang="en-US"/>
+              </a:p>
+            </p:txBody>
+          </p:sp>
+          <p:sp>
+            <p:nvSpPr>
+              <p:cNvPr id="31" name="Rectangle 30"/>
+              <p:cNvSpPr/>
+              <p:nvPr/>
+            </p:nvSpPr>
+            <p:spPr>
+              <a:xfrm>
+                <a:off x="7152640" y="4127945"/>
+                <a:ext cx="310056" cy="114531"/>
+              </a:xfrm>
+              <a:prstGeom prst="rect">
+                <a:avLst/>
+              </a:prstGeom>
+              <a:ln w="28575"/>
+              <a:effectLst/>
+            </p:spPr>
+            <p:style>
+              <a:lnRef idx="2">
+                <a:schemeClr val="accent6">
+                  <a:shade val="50000"/>
+                </a:schemeClr>
+              </a:lnRef>
+              <a:fillRef idx="1">
+                <a:schemeClr val="accent6"/>
+              </a:fillRef>
+              <a:effectRef idx="0">
+                <a:schemeClr val="accent6"/>
+              </a:effectRef>
+              <a:fontRef idx="minor">
+                <a:schemeClr val="lt1"/>
+              </a:fontRef>
+            </p:style>
+            <p:txBody>
+              <a:bodyPr rtlCol="0" anchor="ctr"/>
+              <a:lstStyle/>
+              <a:p>
+                <a:pPr algn="ctr"/>
+                <a:endParaRPr lang="en-US"/>
+              </a:p>
+            </p:txBody>
+          </p:sp>
+          <p:sp>
+            <p:nvSpPr>
+              <p:cNvPr id="32" name="Rectangle 31"/>
+              <p:cNvSpPr/>
+              <p:nvPr/>
+            </p:nvSpPr>
+            <p:spPr>
+              <a:xfrm>
+                <a:off x="7608298" y="4127945"/>
+                <a:ext cx="310056" cy="114531"/>
+              </a:xfrm>
+              <a:prstGeom prst="rect">
+                <a:avLst/>
+              </a:prstGeom>
+              <a:ln w="28575"/>
+              <a:effectLst/>
+            </p:spPr>
+            <p:style>
+              <a:lnRef idx="2">
+                <a:schemeClr val="accent6">
+                  <a:shade val="50000"/>
+                </a:schemeClr>
+              </a:lnRef>
+              <a:fillRef idx="1">
+                <a:schemeClr val="accent6"/>
+              </a:fillRef>
+              <a:effectRef idx="0">
+                <a:schemeClr val="accent6"/>
+              </a:effectRef>
+              <a:fontRef idx="minor">
+                <a:schemeClr val="lt1"/>
+              </a:fontRef>
+            </p:style>
+            <p:txBody>
+              <a:bodyPr rtlCol="0" anchor="ctr"/>
+              <a:lstStyle/>
+              <a:p>
+                <a:pPr algn="ctr"/>
+                <a:endParaRPr lang="en-US"/>
+              </a:p>
+            </p:txBody>
+          </p:sp>
+          <p:sp>
+            <p:nvSpPr>
+              <p:cNvPr id="33" name="Rectangle 32"/>
+              <p:cNvSpPr/>
+              <p:nvPr/>
+            </p:nvSpPr>
+            <p:spPr>
+              <a:xfrm>
+                <a:off x="8063956" y="4127945"/>
+                <a:ext cx="310056" cy="114531"/>
+              </a:xfrm>
+              <a:prstGeom prst="rect">
+                <a:avLst/>
+              </a:prstGeom>
+              <a:ln w="28575"/>
+              <a:effectLst/>
+            </p:spPr>
+            <p:style>
+              <a:lnRef idx="2">
+                <a:schemeClr val="accent6">
+                  <a:shade val="50000"/>
+                </a:schemeClr>
+              </a:lnRef>
+              <a:fillRef idx="1">
+                <a:schemeClr val="accent6"/>
+              </a:fillRef>
+              <a:effectRef idx="0">
+                <a:schemeClr val="accent6"/>
+              </a:effectRef>
+              <a:fontRef idx="minor">
+                <a:schemeClr val="lt1"/>
+              </a:fontRef>
+            </p:style>
+            <p:txBody>
+              <a:bodyPr rtlCol="0" anchor="ctr"/>
+              <a:lstStyle/>
+              <a:p>
+                <a:pPr algn="ctr"/>
+                <a:endParaRPr lang="en-US"/>
+              </a:p>
+            </p:txBody>
+          </p:sp>
+          <p:sp>
+            <p:nvSpPr>
+              <p:cNvPr id="34" name="Rectangle 33"/>
+              <p:cNvSpPr/>
+              <p:nvPr/>
+            </p:nvSpPr>
+            <p:spPr>
+              <a:xfrm>
+                <a:off x="8519612" y="4127945"/>
+                <a:ext cx="310056" cy="114531"/>
+              </a:xfrm>
+              <a:prstGeom prst="rect">
+                <a:avLst/>
+              </a:prstGeom>
+              <a:ln w="28575"/>
+              <a:effectLst/>
+            </p:spPr>
+            <p:style>
+              <a:lnRef idx="2">
+                <a:schemeClr val="accent6">
+                  <a:shade val="50000"/>
+                </a:schemeClr>
+              </a:lnRef>
+              <a:fillRef idx="1">
+                <a:schemeClr val="accent6"/>
+              </a:fillRef>
+              <a:effectRef idx="0">
+                <a:schemeClr val="accent6"/>
+              </a:effectRef>
+              <a:fontRef idx="minor">
+                <a:schemeClr val="lt1"/>
+              </a:fontRef>
+            </p:style>
+            <p:txBody>
+              <a:bodyPr rtlCol="0" anchor="ctr"/>
+              <a:lstStyle/>
+              <a:p>
+                <a:pPr algn="ctr"/>
+                <a:endParaRPr lang="en-US"/>
+              </a:p>
+            </p:txBody>
+          </p:sp>
+        </p:grpSp>
+        <p:grpSp>
+          <p:nvGrpSpPr>
+            <p:cNvPr id="44" name="Group 43"/>
+            <p:cNvGrpSpPr/>
+            <p:nvPr/>
+          </p:nvGrpSpPr>
+          <p:grpSpPr>
+            <a:xfrm>
+              <a:off x="6241324" y="4308842"/>
+              <a:ext cx="2588344" cy="114531"/>
+              <a:chOff x="6241324" y="4321209"/>
+              <a:chExt cx="2588344" cy="114531"/>
+            </a:xfrm>
+          </p:grpSpPr>
+          <p:sp>
+            <p:nvSpPr>
+              <p:cNvPr id="35" name="Rectangle 34"/>
+              <p:cNvSpPr/>
+              <p:nvPr/>
+            </p:nvSpPr>
+            <p:spPr>
+              <a:xfrm>
+                <a:off x="6241324" y="4321209"/>
+                <a:ext cx="310056" cy="114531"/>
+              </a:xfrm>
+              <a:prstGeom prst="rect">
+                <a:avLst/>
+              </a:prstGeom>
+              <a:ln w="28575"/>
+              <a:effectLst/>
+            </p:spPr>
+            <p:style>
+              <a:lnRef idx="2">
+                <a:schemeClr val="accent6">
+                  <a:shade val="50000"/>
+                </a:schemeClr>
+              </a:lnRef>
+              <a:fillRef idx="1">
+                <a:schemeClr val="accent6"/>
+              </a:fillRef>
+              <a:effectRef idx="0">
+                <a:schemeClr val="accent6"/>
+              </a:effectRef>
+              <a:fontRef idx="minor">
+                <a:schemeClr val="lt1"/>
+              </a:fontRef>
+            </p:style>
+            <p:txBody>
+              <a:bodyPr rtlCol="0" anchor="ctr"/>
+              <a:lstStyle/>
+              <a:p>
+                <a:pPr algn="ctr"/>
+                <a:endParaRPr lang="en-US"/>
+              </a:p>
+            </p:txBody>
+          </p:sp>
+          <p:sp>
+            <p:nvSpPr>
+              <p:cNvPr id="36" name="Rectangle 35"/>
+              <p:cNvSpPr/>
+              <p:nvPr/>
+            </p:nvSpPr>
+            <p:spPr>
+              <a:xfrm>
+                <a:off x="6696982" y="4321209"/>
+                <a:ext cx="310056" cy="114531"/>
+              </a:xfrm>
+              <a:prstGeom prst="rect">
+                <a:avLst/>
+              </a:prstGeom>
+              <a:ln w="28575"/>
+              <a:effectLst/>
+            </p:spPr>
+            <p:style>
+              <a:lnRef idx="2">
+                <a:schemeClr val="accent6">
+                  <a:shade val="50000"/>
+                </a:schemeClr>
+              </a:lnRef>
+              <a:fillRef idx="1">
+                <a:schemeClr val="accent6"/>
+              </a:fillRef>
+              <a:effectRef idx="0">
+                <a:schemeClr val="accent6"/>
+              </a:effectRef>
+              <a:fontRef idx="minor">
+                <a:schemeClr val="lt1"/>
+              </a:fontRef>
+            </p:style>
+            <p:txBody>
+              <a:bodyPr rtlCol="0" anchor="ctr"/>
+              <a:lstStyle/>
+              <a:p>
+                <a:pPr algn="ctr"/>
+                <a:endParaRPr lang="en-US"/>
+              </a:p>
+            </p:txBody>
+          </p:sp>
+          <p:sp>
+            <p:nvSpPr>
+              <p:cNvPr id="37" name="Rectangle 36"/>
+              <p:cNvSpPr/>
+              <p:nvPr/>
+            </p:nvSpPr>
+            <p:spPr>
+              <a:xfrm>
+                <a:off x="7152640" y="4321209"/>
+                <a:ext cx="310056" cy="114531"/>
+              </a:xfrm>
+              <a:prstGeom prst="rect">
+                <a:avLst/>
+              </a:prstGeom>
+              <a:ln w="28575"/>
+              <a:effectLst/>
+            </p:spPr>
+            <p:style>
+              <a:lnRef idx="2">
+                <a:schemeClr val="accent6">
+                  <a:shade val="50000"/>
+                </a:schemeClr>
+              </a:lnRef>
+              <a:fillRef idx="1">
+                <a:schemeClr val="accent6"/>
+              </a:fillRef>
+              <a:effectRef idx="0">
+                <a:schemeClr val="accent6"/>
+              </a:effectRef>
+              <a:fontRef idx="minor">
+                <a:schemeClr val="lt1"/>
+              </a:fontRef>
+            </p:style>
+            <p:txBody>
+              <a:bodyPr rtlCol="0" anchor="ctr"/>
+              <a:lstStyle/>
+              <a:p>
+                <a:pPr algn="ctr"/>
+                <a:endParaRPr lang="en-US"/>
+              </a:p>
+            </p:txBody>
+          </p:sp>
+          <p:sp>
+            <p:nvSpPr>
+              <p:cNvPr id="38" name="Rectangle 37"/>
+              <p:cNvSpPr/>
+              <p:nvPr/>
+            </p:nvSpPr>
+            <p:spPr>
+              <a:xfrm>
+                <a:off x="7608298" y="4321209"/>
+                <a:ext cx="310056" cy="114531"/>
+              </a:xfrm>
+              <a:prstGeom prst="rect">
+                <a:avLst/>
+              </a:prstGeom>
+              <a:ln w="28575"/>
+              <a:effectLst/>
+            </p:spPr>
+            <p:style>
+              <a:lnRef idx="2">
+                <a:schemeClr val="accent6">
+                  <a:shade val="50000"/>
+                </a:schemeClr>
+              </a:lnRef>
+              <a:fillRef idx="1">
+                <a:schemeClr val="accent6"/>
+              </a:fillRef>
+              <a:effectRef idx="0">
+                <a:schemeClr val="accent6"/>
+              </a:effectRef>
+              <a:fontRef idx="minor">
+                <a:schemeClr val="lt1"/>
+              </a:fontRef>
+            </p:style>
+            <p:txBody>
+              <a:bodyPr rtlCol="0" anchor="ctr"/>
+              <a:lstStyle/>
+              <a:p>
+                <a:pPr algn="ctr"/>
+                <a:endParaRPr lang="en-US"/>
+              </a:p>
+            </p:txBody>
+          </p:sp>
+          <p:sp>
+            <p:nvSpPr>
+              <p:cNvPr id="39" name="Rectangle 38"/>
+              <p:cNvSpPr/>
+              <p:nvPr/>
+            </p:nvSpPr>
+            <p:spPr>
+              <a:xfrm>
+                <a:off x="8063956" y="4321209"/>
+                <a:ext cx="310056" cy="114531"/>
+              </a:xfrm>
+              <a:prstGeom prst="rect">
+                <a:avLst/>
+              </a:prstGeom>
+              <a:ln w="28575"/>
+              <a:effectLst/>
+            </p:spPr>
+            <p:style>
+              <a:lnRef idx="2">
+                <a:schemeClr val="accent6">
+                  <a:shade val="50000"/>
+                </a:schemeClr>
+              </a:lnRef>
+              <a:fillRef idx="1">
+                <a:schemeClr val="accent6"/>
+              </a:fillRef>
+              <a:effectRef idx="0">
+                <a:schemeClr val="accent6"/>
+              </a:effectRef>
+              <a:fontRef idx="minor">
+                <a:schemeClr val="lt1"/>
+              </a:fontRef>
+            </p:style>
+            <p:txBody>
+              <a:bodyPr rtlCol="0" anchor="ctr"/>
+              <a:lstStyle/>
+              <a:p>
+                <a:pPr algn="ctr"/>
+                <a:endParaRPr lang="en-US"/>
+              </a:p>
+            </p:txBody>
+          </p:sp>
+          <p:sp>
+            <p:nvSpPr>
+              <p:cNvPr id="40" name="Rectangle 39"/>
+              <p:cNvSpPr/>
+              <p:nvPr/>
+            </p:nvSpPr>
+            <p:spPr>
+              <a:xfrm>
+                <a:off x="8519612" y="4321209"/>
+                <a:ext cx="310056" cy="114531"/>
+              </a:xfrm>
+              <a:prstGeom prst="rect">
+                <a:avLst/>
+              </a:prstGeom>
+              <a:ln w="28575"/>
+              <a:effectLst/>
+            </p:spPr>
+            <p:style>
+              <a:lnRef idx="2">
+                <a:schemeClr val="accent6">
+                  <a:shade val="50000"/>
+                </a:schemeClr>
+              </a:lnRef>
+              <a:fillRef idx="1">
+                <a:schemeClr val="accent6"/>
+              </a:fillRef>
+              <a:effectRef idx="0">
+                <a:schemeClr val="accent6"/>
+              </a:effectRef>
+              <a:fontRef idx="minor">
+                <a:schemeClr val="lt1"/>
+              </a:fontRef>
+            </p:style>
+            <p:txBody>
+              <a:bodyPr rtlCol="0" anchor="ctr"/>
+              <a:lstStyle/>
+              <a:p>
+                <a:pPr algn="ctr"/>
+                <a:endParaRPr lang="en-US"/>
+              </a:p>
+            </p:txBody>
+          </p:sp>
+        </p:grpSp>
+      </p:grpSp>
+      <p:grpSp>
+        <p:nvGrpSpPr>
+          <p:cNvPr id="63" name="Group 62"/>
+          <p:cNvGrpSpPr/>
+          <p:nvPr/>
+        </p:nvGrpSpPr>
+        <p:grpSpPr>
+          <a:xfrm>
+            <a:off x="2688856" y="3065841"/>
+            <a:ext cx="2403650" cy="247130"/>
+            <a:chOff x="2189452" y="4061712"/>
+            <a:chExt cx="2855053" cy="457200"/>
+          </a:xfrm>
+        </p:grpSpPr>
+        <p:sp>
+          <p:nvSpPr>
+            <p:cNvPr id="3" name="Rectangle 2"/>
+            <p:cNvSpPr/>
+            <p:nvPr/>
+          </p:nvSpPr>
+          <p:spPr>
+            <a:xfrm>
+              <a:off x="3613889" y="4061712"/>
+              <a:ext cx="178693" cy="457200"/>
+            </a:xfrm>
+            <a:prstGeom prst="rect">
+              <a:avLst/>
+            </a:prstGeom>
+          </p:spPr>
+          <p:style>
+            <a:lnRef idx="2">
+              <a:schemeClr val="accent3">
+                <a:shade val="50000"/>
+              </a:schemeClr>
+            </a:lnRef>
+            <a:fillRef idx="1">
+              <a:schemeClr val="accent3"/>
+            </a:fillRef>
+            <a:effectRef idx="0">
+              <a:schemeClr val="accent3"/>
+            </a:effectRef>
+            <a:fontRef idx="minor">
+              <a:schemeClr val="lt1"/>
+            </a:fontRef>
+          </p:style>
+          <p:txBody>
+            <a:bodyPr rtlCol="0" anchor="ctr"/>
+            <a:lstStyle/>
+            <a:p>
+              <a:pPr algn="ctr"/>
+              <a:endParaRPr lang="en-US"/>
+            </a:p>
+          </p:txBody>
+        </p:sp>
+        <p:sp>
+          <p:nvSpPr>
+            <p:cNvPr id="47" name="Rectangle 46"/>
+            <p:cNvSpPr/>
+            <p:nvPr/>
+          </p:nvSpPr>
+          <p:spPr>
+            <a:xfrm>
+              <a:off x="3793654" y="4061712"/>
+              <a:ext cx="178693" cy="457200"/>
+            </a:xfrm>
+            <a:prstGeom prst="rect">
+              <a:avLst/>
+            </a:prstGeom>
+          </p:spPr>
+          <p:style>
+            <a:lnRef idx="2">
+              <a:schemeClr val="accent3">
+                <a:shade val="50000"/>
+              </a:schemeClr>
+            </a:lnRef>
+            <a:fillRef idx="1">
+              <a:schemeClr val="accent3"/>
+            </a:fillRef>
+            <a:effectRef idx="0">
+              <a:schemeClr val="accent3"/>
+            </a:effectRef>
+            <a:fontRef idx="minor">
+              <a:schemeClr val="lt1"/>
+            </a:fontRef>
+          </p:style>
+          <p:txBody>
+            <a:bodyPr rtlCol="0" anchor="ctr"/>
+            <a:lstStyle/>
+            <a:p>
+              <a:pPr algn="ctr"/>
+              <a:endParaRPr lang="en-US"/>
+            </a:p>
+          </p:txBody>
+        </p:sp>
+        <p:sp>
+          <p:nvSpPr>
+            <p:cNvPr id="49" name="Rectangle 48"/>
+            <p:cNvSpPr/>
+            <p:nvPr/>
+          </p:nvSpPr>
+          <p:spPr>
+            <a:xfrm>
+              <a:off x="3972347" y="4061712"/>
+              <a:ext cx="178693" cy="457200"/>
+            </a:xfrm>
+            <a:prstGeom prst="rect">
+              <a:avLst/>
+            </a:prstGeom>
+          </p:spPr>
+          <p:style>
+            <a:lnRef idx="2">
+              <a:schemeClr val="accent3">
+                <a:shade val="50000"/>
+              </a:schemeClr>
+            </a:lnRef>
+            <a:fillRef idx="1">
+              <a:schemeClr val="accent3"/>
+            </a:fillRef>
+            <a:effectRef idx="0">
+              <a:schemeClr val="accent3"/>
+            </a:effectRef>
+            <a:fontRef idx="minor">
+              <a:schemeClr val="lt1"/>
+            </a:fontRef>
+          </p:style>
+          <p:txBody>
+            <a:bodyPr rtlCol="0" anchor="ctr"/>
+            <a:lstStyle/>
+            <a:p>
+              <a:pPr algn="ctr"/>
+              <a:endParaRPr lang="en-US"/>
+            </a:p>
+          </p:txBody>
+        </p:sp>
+        <p:sp>
+          <p:nvSpPr>
+            <p:cNvPr id="50" name="Rectangle 49"/>
+            <p:cNvSpPr/>
+            <p:nvPr/>
+          </p:nvSpPr>
+          <p:spPr>
+            <a:xfrm>
+              <a:off x="4151040" y="4061712"/>
+              <a:ext cx="178693" cy="457200"/>
+            </a:xfrm>
+            <a:prstGeom prst="rect">
+              <a:avLst/>
+            </a:prstGeom>
+          </p:spPr>
+          <p:style>
+            <a:lnRef idx="2">
+              <a:schemeClr val="accent3">
+                <a:shade val="50000"/>
+              </a:schemeClr>
+            </a:lnRef>
+            <a:fillRef idx="1">
+              <a:schemeClr val="accent3"/>
+            </a:fillRef>
+            <a:effectRef idx="0">
+              <a:schemeClr val="accent3"/>
+            </a:effectRef>
+            <a:fontRef idx="minor">
+              <a:schemeClr val="lt1"/>
+            </a:fontRef>
+          </p:style>
+          <p:txBody>
+            <a:bodyPr rtlCol="0" anchor="ctr"/>
+            <a:lstStyle/>
+            <a:p>
+              <a:pPr algn="ctr"/>
+              <a:endParaRPr lang="en-US"/>
+            </a:p>
+          </p:txBody>
+        </p:sp>
+        <p:sp>
+          <p:nvSpPr>
+            <p:cNvPr id="51" name="Rectangle 50"/>
+            <p:cNvSpPr/>
+            <p:nvPr/>
+          </p:nvSpPr>
+          <p:spPr>
+            <a:xfrm>
+              <a:off x="4328661" y="4061712"/>
+              <a:ext cx="178693" cy="457200"/>
+            </a:xfrm>
+            <a:prstGeom prst="rect">
+              <a:avLst/>
+            </a:prstGeom>
+          </p:spPr>
+          <p:style>
+            <a:lnRef idx="2">
+              <a:schemeClr val="accent3"/>
+            </a:lnRef>
+            <a:fillRef idx="1">
+              <a:schemeClr val="lt1"/>
+            </a:fillRef>
+            <a:effectRef idx="0">
+              <a:schemeClr val="accent3"/>
+            </a:effectRef>
+            <a:fontRef idx="minor">
+              <a:schemeClr val="dk1"/>
+            </a:fontRef>
+          </p:style>
+          <p:txBody>
+            <a:bodyPr rtlCol="0" anchor="ctr"/>
+            <a:lstStyle/>
+            <a:p>
+              <a:pPr algn="ctr"/>
+              <a:endParaRPr lang="en-US"/>
+            </a:p>
+          </p:txBody>
+        </p:sp>
+        <p:sp>
+          <p:nvSpPr>
+            <p:cNvPr id="52" name="Rectangle 51"/>
+            <p:cNvSpPr/>
+            <p:nvPr/>
+          </p:nvSpPr>
+          <p:spPr>
+            <a:xfrm>
+              <a:off x="4508426" y="4061712"/>
+              <a:ext cx="178693" cy="457200"/>
+            </a:xfrm>
+            <a:prstGeom prst="rect">
+              <a:avLst/>
+            </a:prstGeom>
+          </p:spPr>
+          <p:style>
+            <a:lnRef idx="2">
+              <a:schemeClr val="accent3"/>
+            </a:lnRef>
+            <a:fillRef idx="1">
+              <a:schemeClr val="lt1"/>
+            </a:fillRef>
+            <a:effectRef idx="0">
+              <a:schemeClr val="accent3"/>
+            </a:effectRef>
+            <a:fontRef idx="minor">
+              <a:schemeClr val="dk1"/>
+            </a:fontRef>
+          </p:style>
+          <p:txBody>
+            <a:bodyPr rtlCol="0" anchor="ctr"/>
+            <a:lstStyle/>
+            <a:p>
+              <a:pPr algn="ctr"/>
+              <a:endParaRPr lang="en-US"/>
+            </a:p>
+          </p:txBody>
+        </p:sp>
+        <p:sp>
+          <p:nvSpPr>
+            <p:cNvPr id="53" name="Rectangle 52"/>
+            <p:cNvSpPr/>
+            <p:nvPr/>
+          </p:nvSpPr>
+          <p:spPr>
+            <a:xfrm>
+              <a:off x="4687119" y="4061712"/>
+              <a:ext cx="178693" cy="457200"/>
+            </a:xfrm>
+            <a:prstGeom prst="rect">
+              <a:avLst/>
+            </a:prstGeom>
+          </p:spPr>
+          <p:style>
+            <a:lnRef idx="2">
+              <a:schemeClr val="accent3"/>
+            </a:lnRef>
+            <a:fillRef idx="1">
+              <a:schemeClr val="lt1"/>
+            </a:fillRef>
+            <a:effectRef idx="0">
+              <a:schemeClr val="accent3"/>
+            </a:effectRef>
+            <a:fontRef idx="minor">
+              <a:schemeClr val="dk1"/>
+            </a:fontRef>
+          </p:style>
+          <p:txBody>
+            <a:bodyPr rtlCol="0" anchor="ctr"/>
+            <a:lstStyle/>
+            <a:p>
+              <a:pPr algn="ctr"/>
+              <a:endParaRPr lang="en-US"/>
+            </a:p>
+          </p:txBody>
+        </p:sp>
+        <p:sp>
+          <p:nvSpPr>
+            <p:cNvPr id="54" name="Rectangle 53"/>
+            <p:cNvSpPr/>
+            <p:nvPr/>
+          </p:nvSpPr>
+          <p:spPr>
+            <a:xfrm>
+              <a:off x="4865812" y="4061712"/>
+              <a:ext cx="178693" cy="457200"/>
+            </a:xfrm>
+            <a:prstGeom prst="rect">
+              <a:avLst/>
+            </a:prstGeom>
+          </p:spPr>
+          <p:style>
+            <a:lnRef idx="2">
+              <a:schemeClr val="accent3"/>
+            </a:lnRef>
+            <a:fillRef idx="1">
+              <a:schemeClr val="lt1"/>
+            </a:fillRef>
+            <a:effectRef idx="0">
+              <a:schemeClr val="accent3"/>
+            </a:effectRef>
+            <a:fontRef idx="minor">
+              <a:schemeClr val="dk1"/>
+            </a:fontRef>
+          </p:style>
+          <p:txBody>
+            <a:bodyPr rtlCol="0" anchor="ctr"/>
+            <a:lstStyle/>
+            <a:p>
+              <a:pPr algn="ctr"/>
+              <a:endParaRPr lang="en-US"/>
+            </a:p>
+          </p:txBody>
+        </p:sp>
+        <p:sp>
+          <p:nvSpPr>
+            <p:cNvPr id="55" name="Rectangle 54"/>
+            <p:cNvSpPr/>
+            <p:nvPr/>
+          </p:nvSpPr>
+          <p:spPr>
+            <a:xfrm>
+              <a:off x="2189452" y="4061712"/>
+              <a:ext cx="178693" cy="457200"/>
+            </a:xfrm>
+            <a:prstGeom prst="rect">
+              <a:avLst/>
+            </a:prstGeom>
+          </p:spPr>
+          <p:style>
+            <a:lnRef idx="1">
+              <a:schemeClr val="accent3"/>
+            </a:lnRef>
+            <a:fillRef idx="2">
+              <a:schemeClr val="accent3"/>
+            </a:fillRef>
+            <a:effectRef idx="1">
+              <a:schemeClr val="accent3"/>
+            </a:effectRef>
+            <a:fontRef idx="minor">
+              <a:schemeClr val="dk1"/>
+            </a:fontRef>
+          </p:style>
+          <p:txBody>
+            <a:bodyPr rtlCol="0" anchor="ctr"/>
+            <a:lstStyle/>
+            <a:p>
+              <a:pPr algn="ctr"/>
+              <a:endParaRPr lang="en-US"/>
+            </a:p>
+          </p:txBody>
+        </p:sp>
+        <p:sp>
+          <p:nvSpPr>
+            <p:cNvPr id="56" name="Rectangle 55"/>
+            <p:cNvSpPr/>
+            <p:nvPr/>
+          </p:nvSpPr>
+          <p:spPr>
+            <a:xfrm>
+              <a:off x="2369217" y="4061712"/>
+              <a:ext cx="178693" cy="457200"/>
+            </a:xfrm>
+            <a:prstGeom prst="rect">
+              <a:avLst/>
+            </a:prstGeom>
+          </p:spPr>
+          <p:style>
+            <a:lnRef idx="1">
+              <a:schemeClr val="accent3"/>
+            </a:lnRef>
+            <a:fillRef idx="2">
+              <a:schemeClr val="accent3"/>
+            </a:fillRef>
+            <a:effectRef idx="1">
+              <a:schemeClr val="accent3"/>
+            </a:effectRef>
+            <a:fontRef idx="minor">
+              <a:schemeClr val="dk1"/>
+            </a:fontRef>
+          </p:style>
+          <p:txBody>
+            <a:bodyPr rtlCol="0" anchor="ctr"/>
+            <a:lstStyle/>
+            <a:p>
+              <a:pPr algn="ctr"/>
+              <a:endParaRPr lang="en-US"/>
+            </a:p>
+          </p:txBody>
+        </p:sp>
+        <p:sp>
+          <p:nvSpPr>
+            <p:cNvPr id="57" name="Rectangle 56"/>
+            <p:cNvSpPr/>
+            <p:nvPr/>
+          </p:nvSpPr>
+          <p:spPr>
+            <a:xfrm>
+              <a:off x="2547910" y="4061712"/>
+              <a:ext cx="178693" cy="457200"/>
+            </a:xfrm>
+            <a:prstGeom prst="rect">
+              <a:avLst/>
+            </a:prstGeom>
+          </p:spPr>
+          <p:style>
+            <a:lnRef idx="1">
+              <a:schemeClr val="accent3"/>
+            </a:lnRef>
+            <a:fillRef idx="2">
+              <a:schemeClr val="accent3"/>
+            </a:fillRef>
+            <a:effectRef idx="1">
+              <a:schemeClr val="accent3"/>
+            </a:effectRef>
+            <a:fontRef idx="minor">
+              <a:schemeClr val="dk1"/>
+            </a:fontRef>
+          </p:style>
+          <p:txBody>
+            <a:bodyPr rtlCol="0" anchor="ctr"/>
+            <a:lstStyle/>
+            <a:p>
+              <a:pPr algn="ctr"/>
+              <a:endParaRPr lang="en-US"/>
+            </a:p>
+          </p:txBody>
+        </p:sp>
+        <p:sp>
+          <p:nvSpPr>
+            <p:cNvPr id="58" name="Rectangle 57"/>
+            <p:cNvSpPr/>
+            <p:nvPr/>
+          </p:nvSpPr>
+          <p:spPr>
+            <a:xfrm>
+              <a:off x="2726603" y="4061712"/>
+              <a:ext cx="178693" cy="457200"/>
+            </a:xfrm>
+            <a:prstGeom prst="rect">
+              <a:avLst/>
+            </a:prstGeom>
+          </p:spPr>
+          <p:style>
+            <a:lnRef idx="2">
+              <a:schemeClr val="accent3">
+                <a:shade val="50000"/>
+              </a:schemeClr>
+            </a:lnRef>
+            <a:fillRef idx="1">
+              <a:schemeClr val="accent3"/>
+            </a:fillRef>
+            <a:effectRef idx="0">
+              <a:schemeClr val="accent3"/>
+            </a:effectRef>
+            <a:fontRef idx="minor">
+              <a:schemeClr val="lt1"/>
+            </a:fontRef>
+          </p:style>
+          <p:txBody>
+            <a:bodyPr rtlCol="0" anchor="ctr"/>
+            <a:lstStyle/>
+            <a:p>
+              <a:pPr algn="ctr"/>
+              <a:endParaRPr lang="en-US"/>
+            </a:p>
+          </p:txBody>
+        </p:sp>
+        <p:sp>
+          <p:nvSpPr>
+            <p:cNvPr id="59" name="Rectangle 58"/>
+            <p:cNvSpPr/>
+            <p:nvPr/>
+          </p:nvSpPr>
+          <p:spPr>
+            <a:xfrm>
+              <a:off x="2904224" y="4061712"/>
+              <a:ext cx="178693" cy="457200"/>
+            </a:xfrm>
+            <a:prstGeom prst="rect">
+              <a:avLst/>
+            </a:prstGeom>
+          </p:spPr>
+          <p:style>
+            <a:lnRef idx="2">
+              <a:schemeClr val="accent3">
+                <a:shade val="50000"/>
+              </a:schemeClr>
+            </a:lnRef>
+            <a:fillRef idx="1">
+              <a:schemeClr val="accent3"/>
+            </a:fillRef>
+            <a:effectRef idx="0">
+              <a:schemeClr val="accent3"/>
+            </a:effectRef>
+            <a:fontRef idx="minor">
+              <a:schemeClr val="lt1"/>
+            </a:fontRef>
+          </p:style>
+          <p:txBody>
+            <a:bodyPr rtlCol="0" anchor="ctr"/>
+            <a:lstStyle/>
+            <a:p>
+              <a:pPr algn="ctr"/>
+              <a:endParaRPr lang="en-US"/>
+            </a:p>
+          </p:txBody>
+        </p:sp>
+        <p:sp>
+          <p:nvSpPr>
+            <p:cNvPr id="60" name="Rectangle 59"/>
+            <p:cNvSpPr/>
+            <p:nvPr/>
+          </p:nvSpPr>
+          <p:spPr>
+            <a:xfrm>
+              <a:off x="3083989" y="4061712"/>
+              <a:ext cx="178693" cy="457200"/>
+            </a:xfrm>
+            <a:prstGeom prst="rect">
+              <a:avLst/>
+            </a:prstGeom>
+          </p:spPr>
+          <p:style>
+            <a:lnRef idx="2">
+              <a:schemeClr val="accent3">
+                <a:shade val="50000"/>
+              </a:schemeClr>
+            </a:lnRef>
+            <a:fillRef idx="1">
+              <a:schemeClr val="accent3"/>
+            </a:fillRef>
+            <a:effectRef idx="0">
+              <a:schemeClr val="accent3"/>
+            </a:effectRef>
+            <a:fontRef idx="minor">
+              <a:schemeClr val="lt1"/>
+            </a:fontRef>
+          </p:style>
+          <p:txBody>
+            <a:bodyPr rtlCol="0" anchor="ctr"/>
+            <a:lstStyle/>
+            <a:p>
+              <a:pPr algn="ctr"/>
+              <a:endParaRPr lang="en-US"/>
+            </a:p>
+          </p:txBody>
+        </p:sp>
+        <p:sp>
+          <p:nvSpPr>
+            <p:cNvPr id="61" name="Rectangle 60"/>
+            <p:cNvSpPr/>
+            <p:nvPr/>
+          </p:nvSpPr>
+          <p:spPr>
+            <a:xfrm>
+              <a:off x="3262682" y="4061712"/>
+              <a:ext cx="178693" cy="457200"/>
+            </a:xfrm>
+            <a:prstGeom prst="rect">
+              <a:avLst/>
+            </a:prstGeom>
+          </p:spPr>
+          <p:style>
+            <a:lnRef idx="2">
+              <a:schemeClr val="accent3">
+                <a:shade val="50000"/>
+              </a:schemeClr>
+            </a:lnRef>
+            <a:fillRef idx="1">
+              <a:schemeClr val="accent3"/>
+            </a:fillRef>
+            <a:effectRef idx="0">
+              <a:schemeClr val="accent3"/>
+            </a:effectRef>
+            <a:fontRef idx="minor">
+              <a:schemeClr val="lt1"/>
+            </a:fontRef>
+          </p:style>
+          <p:txBody>
+            <a:bodyPr rtlCol="0" anchor="ctr"/>
+            <a:lstStyle/>
+            <a:p>
+              <a:pPr algn="ctr"/>
+              <a:endParaRPr lang="en-US"/>
+            </a:p>
+          </p:txBody>
+        </p:sp>
+        <p:sp>
+          <p:nvSpPr>
+            <p:cNvPr id="62" name="Rectangle 61"/>
+            <p:cNvSpPr/>
+            <p:nvPr/>
+          </p:nvSpPr>
+          <p:spPr>
+            <a:xfrm>
+              <a:off x="3441375" y="4061712"/>
+              <a:ext cx="178693" cy="457200"/>
+            </a:xfrm>
+            <a:prstGeom prst="rect">
+              <a:avLst/>
+            </a:prstGeom>
+          </p:spPr>
+          <p:style>
+            <a:lnRef idx="2">
+              <a:schemeClr val="accent3">
+                <a:shade val="50000"/>
+              </a:schemeClr>
+            </a:lnRef>
+            <a:fillRef idx="1">
+              <a:schemeClr val="accent3"/>
+            </a:fillRef>
+            <a:effectRef idx="0">
+              <a:schemeClr val="accent3"/>
+            </a:effectRef>
+            <a:fontRef idx="minor">
+              <a:schemeClr val="lt1"/>
+            </a:fontRef>
+          </p:style>
+          <p:txBody>
+            <a:bodyPr rtlCol="0" anchor="ctr"/>
+            <a:lstStyle/>
+            <a:p>
+              <a:pPr algn="ctr"/>
+              <a:endParaRPr lang="en-US"/>
+            </a:p>
+          </p:txBody>
+        </p:sp>
+      </p:grpSp>
+      <p:sp>
+        <p:nvSpPr>
+          <p:cNvPr id="64" name="TextBox 63"/>
+          <p:cNvSpPr txBox="1"/>
+          <p:nvPr/>
+        </p:nvSpPr>
+        <p:spPr>
+          <a:xfrm>
+            <a:off x="2729165" y="3524773"/>
+            <a:ext cx="970965" cy="215444"/>
+          </a:xfrm>
+          <a:prstGeom prst="rect">
+            <a:avLst/>
+          </a:prstGeom>
+          <a:noFill/>
+        </p:spPr>
+        <p:txBody>
+          <a:bodyPr wrap="square" rtlCol="0">
+            <a:spAutoFit/>
+          </a:bodyPr>
+          <a:lstStyle/>
+          <a:p>
+            <a:pPr algn="ctr"/>
+            <a:r>
+              <a:rPr lang="en-US" altLang="zh-CN" sz="800" dirty="0" err="1" smtClean="0">
+                <a:latin typeface="Microsoft YaHei" charset="-122"/>
+                <a:ea typeface="Microsoft YaHei" charset="-122"/>
+                <a:cs typeface="Microsoft YaHei" charset="-122"/>
+              </a:rPr>
+              <a:t>CheckPoint</a:t>
+            </a:r>
+            <a:endParaRPr lang="en-US" sz="800" dirty="0">
+              <a:latin typeface="Microsoft YaHei" charset="-122"/>
+              <a:ea typeface="Microsoft YaHei" charset="-122"/>
+              <a:cs typeface="Microsoft YaHei" charset="-122"/>
+            </a:endParaRPr>
+          </a:p>
+        </p:txBody>
+      </p:sp>
+      <p:cxnSp>
+        <p:nvCxnSpPr>
+          <p:cNvPr id="66" name="Straight Arrow Connector 65"/>
+          <p:cNvCxnSpPr/>
+          <p:nvPr/>
+        </p:nvCxnSpPr>
+        <p:spPr>
+          <a:xfrm flipV="1">
+            <a:off x="3214647" y="3360548"/>
+            <a:ext cx="1653" cy="162494"/>
+          </a:xfrm>
+          <a:prstGeom prst="straightConnector1">
+            <a:avLst/>
+          </a:prstGeom>
+          <a:ln>
+            <a:tailEnd type="triangle"/>
+          </a:ln>
+        </p:spPr>
+        <p:style>
+          <a:lnRef idx="3">
+            <a:schemeClr val="accent3"/>
+          </a:lnRef>
+          <a:fillRef idx="0">
+            <a:schemeClr val="accent3"/>
+          </a:fillRef>
+          <a:effectRef idx="2">
+            <a:schemeClr val="accent3"/>
+          </a:effectRef>
+          <a:fontRef idx="minor">
+            <a:schemeClr val="tx1"/>
+          </a:fontRef>
+        </p:style>
+      </p:cxnSp>
+      <p:sp>
+        <p:nvSpPr>
+          <p:cNvPr id="71" name="Right Arrow 70"/>
+          <p:cNvSpPr/>
+          <p:nvPr/>
+        </p:nvSpPr>
+        <p:spPr>
+          <a:xfrm>
+            <a:off x="5281436" y="3127623"/>
+            <a:ext cx="292395" cy="123565"/>
+          </a:xfrm>
+          <a:prstGeom prst="rightArrow">
+            <a:avLst/>
+          </a:prstGeom>
+        </p:spPr>
+        <p:style>
+          <a:lnRef idx="2">
+            <a:schemeClr val="accent3">
+              <a:shade val="50000"/>
+            </a:schemeClr>
+          </a:lnRef>
+          <a:fillRef idx="1">
+            <a:schemeClr val="accent3"/>
+          </a:fillRef>
+          <a:effectRef idx="0">
+            <a:schemeClr val="accent3"/>
+          </a:effectRef>
+          <a:fontRef idx="minor">
+            <a:schemeClr val="lt1"/>
+          </a:fontRef>
+        </p:style>
+        <p:txBody>
+          <a:bodyPr rtlCol="0" anchor="ctr"/>
+          <a:lstStyle/>
+          <a:p>
+            <a:pPr algn="ctr"/>
+            <a:endParaRPr lang="en-US"/>
+          </a:p>
+        </p:txBody>
+      </p:sp>
+      <p:sp>
+        <p:nvSpPr>
+          <p:cNvPr id="73" name="TextBox 72"/>
+          <p:cNvSpPr txBox="1"/>
+          <p:nvPr/>
+        </p:nvSpPr>
+        <p:spPr>
+          <a:xfrm>
+            <a:off x="4079579" y="2677385"/>
+            <a:ext cx="970965" cy="215444"/>
+          </a:xfrm>
+          <a:prstGeom prst="rect">
+            <a:avLst/>
+          </a:prstGeom>
+          <a:noFill/>
+        </p:spPr>
+        <p:txBody>
+          <a:bodyPr wrap="square" rtlCol="0">
+            <a:spAutoFit/>
+          </a:bodyPr>
+          <a:lstStyle/>
+          <a:p>
+            <a:pPr algn="ctr"/>
+            <a:r>
+              <a:rPr lang="en-US" altLang="zh-CN" sz="800" dirty="0" err="1" smtClean="0">
+                <a:latin typeface="Microsoft YaHei" charset="-122"/>
+                <a:ea typeface="Microsoft YaHei" charset="-122"/>
+                <a:cs typeface="Microsoft YaHei" charset="-122"/>
+              </a:rPr>
+              <a:t>CurrentPoint</a:t>
+            </a:r>
+            <a:endParaRPr lang="en-US" sz="800" dirty="0">
+              <a:latin typeface="Microsoft YaHei" charset="-122"/>
+              <a:ea typeface="Microsoft YaHei" charset="-122"/>
+              <a:cs typeface="Microsoft YaHei" charset="-122"/>
+            </a:endParaRPr>
+          </a:p>
+        </p:txBody>
+      </p:sp>
+      <p:sp>
+        <p:nvSpPr>
+          <p:cNvPr id="74" name="TextBox 73"/>
+          <p:cNvSpPr txBox="1"/>
+          <p:nvPr/>
+        </p:nvSpPr>
+        <p:spPr>
+          <a:xfrm>
+            <a:off x="5143359" y="3249643"/>
+            <a:ext cx="568547" cy="215444"/>
+          </a:xfrm>
+          <a:prstGeom prst="rect">
+            <a:avLst/>
+          </a:prstGeom>
+          <a:noFill/>
+        </p:spPr>
+        <p:txBody>
+          <a:bodyPr wrap="square" rtlCol="0">
+            <a:spAutoFit/>
+          </a:bodyPr>
+          <a:lstStyle/>
+          <a:p>
+            <a:pPr algn="ctr"/>
+            <a:r>
+              <a:rPr lang="en-US" altLang="zh-CN" sz="800" smtClean="0">
+                <a:latin typeface="Microsoft YaHei" charset="-122"/>
+                <a:ea typeface="Microsoft YaHei" charset="-122"/>
+                <a:cs typeface="Microsoft YaHei" charset="-122"/>
+              </a:rPr>
+              <a:t>Apply</a:t>
+            </a:r>
+            <a:endParaRPr lang="en-US" sz="800" dirty="0">
+              <a:latin typeface="Microsoft YaHei" charset="-122"/>
+              <a:ea typeface="Microsoft YaHei" charset="-122"/>
+              <a:cs typeface="Microsoft YaHei" charset="-122"/>
+            </a:endParaRPr>
+          </a:p>
+        </p:txBody>
+      </p:sp>
+      <p:cxnSp>
+        <p:nvCxnSpPr>
+          <p:cNvPr id="75" name="Straight Arrow Connector 74"/>
+          <p:cNvCxnSpPr>
+            <a:stCxn id="73" idx="2"/>
+          </p:cNvCxnSpPr>
+          <p:nvPr/>
+        </p:nvCxnSpPr>
+        <p:spPr>
+          <a:xfrm flipH="1">
+            <a:off x="4565061" y="2892829"/>
+            <a:ext cx="1" cy="152805"/>
+          </a:xfrm>
+          <a:prstGeom prst="straightConnector1">
+            <a:avLst/>
+          </a:prstGeom>
+          <a:ln>
+            <a:tailEnd type="triangle"/>
+          </a:ln>
+        </p:spPr>
+        <p:style>
+          <a:lnRef idx="3">
+            <a:schemeClr val="accent3"/>
+          </a:lnRef>
+          <a:fillRef idx="0">
+            <a:schemeClr val="accent3"/>
+          </a:fillRef>
+          <a:effectRef idx="2">
+            <a:schemeClr val="accent3"/>
+          </a:effectRef>
+          <a:fontRef idx="minor">
+            <a:schemeClr val="tx1"/>
+          </a:fontRef>
+        </p:style>
+      </p:cxnSp>
+      <p:sp>
+        <p:nvSpPr>
+          <p:cNvPr id="80" name="TextBox 79"/>
+          <p:cNvSpPr txBox="1"/>
+          <p:nvPr/>
+        </p:nvSpPr>
+        <p:spPr>
+          <a:xfrm>
+            <a:off x="3013319" y="3973451"/>
+            <a:ext cx="1609486" cy="215444"/>
+          </a:xfrm>
+          <a:prstGeom prst="rect">
+            <a:avLst/>
+          </a:prstGeom>
+          <a:noFill/>
+        </p:spPr>
+        <p:txBody>
+          <a:bodyPr wrap="square" rtlCol="0">
+            <a:spAutoFit/>
+          </a:bodyPr>
+          <a:lstStyle/>
+          <a:p>
+            <a:pPr algn="ctr"/>
+            <a:r>
+              <a:rPr lang="en-US" altLang="zh-CN" sz="800" dirty="0" smtClean="0">
+                <a:latin typeface="Microsoft YaHei" charset="-122"/>
+                <a:ea typeface="Microsoft YaHei" charset="-122"/>
+                <a:cs typeface="Microsoft YaHei" charset="-122"/>
+              </a:rPr>
+              <a:t>Collection</a:t>
+            </a:r>
+            <a:r>
+              <a:rPr lang="zh-CN" altLang="en-US" sz="800" dirty="0" smtClean="0">
+                <a:latin typeface="Microsoft YaHei" charset="-122"/>
+                <a:ea typeface="Microsoft YaHei" charset="-122"/>
+                <a:cs typeface="Microsoft YaHei" charset="-122"/>
+              </a:rPr>
+              <a:t> </a:t>
+            </a:r>
+            <a:r>
+              <a:rPr lang="en-US" altLang="zh-CN" sz="800" dirty="0" smtClean="0">
+                <a:latin typeface="Microsoft YaHei" charset="-122"/>
+                <a:ea typeface="Microsoft YaHei" charset="-122"/>
+                <a:cs typeface="Microsoft YaHei" charset="-122"/>
+              </a:rPr>
+              <a:t>Transaction</a:t>
+            </a:r>
+            <a:r>
+              <a:rPr lang="zh-CN" altLang="en-US" sz="800" dirty="0" smtClean="0">
+                <a:latin typeface="Microsoft YaHei" charset="-122"/>
+                <a:ea typeface="Microsoft YaHei" charset="-122"/>
+                <a:cs typeface="Microsoft YaHei" charset="-122"/>
+              </a:rPr>
+              <a:t> </a:t>
+            </a:r>
+            <a:r>
+              <a:rPr lang="en-US" altLang="zh-CN" sz="800" dirty="0" smtClean="0">
+                <a:latin typeface="Microsoft YaHei" charset="-122"/>
+                <a:ea typeface="Microsoft YaHei" charset="-122"/>
+                <a:cs typeface="Microsoft YaHei" charset="-122"/>
+              </a:rPr>
+              <a:t>Log</a:t>
+            </a:r>
+            <a:endParaRPr lang="en-US" sz="800" dirty="0">
+              <a:latin typeface="Microsoft YaHei" charset="-122"/>
+              <a:ea typeface="Microsoft YaHei" charset="-122"/>
+              <a:cs typeface="Microsoft YaHei" charset="-122"/>
+            </a:endParaRPr>
+          </a:p>
+        </p:txBody>
+      </p:sp>
+      <p:sp>
+        <p:nvSpPr>
+          <p:cNvPr id="81" name="TextBox 80"/>
+          <p:cNvSpPr txBox="1"/>
+          <p:nvPr/>
+        </p:nvSpPr>
+        <p:spPr>
+          <a:xfrm>
+            <a:off x="6547923" y="3973451"/>
+            <a:ext cx="1609486" cy="215444"/>
+          </a:xfrm>
+          <a:prstGeom prst="rect">
+            <a:avLst/>
+          </a:prstGeom>
+          <a:noFill/>
+        </p:spPr>
+        <p:txBody>
+          <a:bodyPr wrap="square" rtlCol="0">
+            <a:spAutoFit/>
+          </a:bodyPr>
+          <a:lstStyle/>
+          <a:p>
+            <a:pPr algn="ctr"/>
+            <a:r>
+              <a:rPr lang="en-US" altLang="zh-CN" sz="800" dirty="0" smtClean="0">
+                <a:latin typeface="Microsoft YaHei" charset="-122"/>
+                <a:ea typeface="Microsoft YaHei" charset="-122"/>
+                <a:cs typeface="Microsoft YaHei" charset="-122"/>
+              </a:rPr>
+              <a:t>Collection</a:t>
+            </a:r>
+            <a:r>
+              <a:rPr lang="zh-CN" altLang="en-US" sz="800" dirty="0" smtClean="0">
+                <a:latin typeface="Microsoft YaHei" charset="-122"/>
+                <a:ea typeface="Microsoft YaHei" charset="-122"/>
+                <a:cs typeface="Microsoft YaHei" charset="-122"/>
+              </a:rPr>
+              <a:t> </a:t>
+            </a:r>
+            <a:r>
+              <a:rPr lang="en-US" altLang="zh-CN" sz="800" dirty="0" smtClean="0">
+                <a:latin typeface="Microsoft YaHei" charset="-122"/>
+                <a:ea typeface="Microsoft YaHei" charset="-122"/>
+                <a:cs typeface="Microsoft YaHei" charset="-122"/>
+              </a:rPr>
+              <a:t>Data</a:t>
+            </a:r>
+            <a:endParaRPr lang="en-US" sz="800" dirty="0">
+              <a:latin typeface="Microsoft YaHei" charset="-122"/>
+              <a:ea typeface="Microsoft YaHei" charset="-122"/>
+              <a:cs typeface="Microsoft YaHei" charset="-122"/>
+            </a:endParaRPr>
+          </a:p>
+        </p:txBody>
+      </p:sp>
+      <p:sp>
+        <p:nvSpPr>
+          <p:cNvPr id="84" name="TextBox 83"/>
+          <p:cNvSpPr txBox="1"/>
+          <p:nvPr/>
+        </p:nvSpPr>
+        <p:spPr>
+          <a:xfrm>
+            <a:off x="3623592" y="3523042"/>
+            <a:ext cx="970965" cy="215444"/>
+          </a:xfrm>
+          <a:prstGeom prst="rect">
+            <a:avLst/>
+          </a:prstGeom>
+          <a:noFill/>
+        </p:spPr>
+        <p:txBody>
+          <a:bodyPr wrap="square" rtlCol="0">
+            <a:spAutoFit/>
+          </a:bodyPr>
+          <a:lstStyle/>
+          <a:p>
+            <a:pPr algn="ctr"/>
+            <a:r>
+              <a:rPr lang="en-US" altLang="zh-CN" sz="800" dirty="0" err="1" smtClean="0">
+                <a:latin typeface="Microsoft YaHei" charset="-122"/>
+                <a:ea typeface="Microsoft YaHei" charset="-122"/>
+                <a:cs typeface="Microsoft YaHei" charset="-122"/>
+              </a:rPr>
+              <a:t>AppliedPoint</a:t>
+            </a:r>
+            <a:endParaRPr lang="en-US" sz="800" dirty="0">
+              <a:latin typeface="Microsoft YaHei" charset="-122"/>
+              <a:ea typeface="Microsoft YaHei" charset="-122"/>
+              <a:cs typeface="Microsoft YaHei" charset="-122"/>
+            </a:endParaRPr>
+          </a:p>
+        </p:txBody>
+      </p:sp>
+      <p:cxnSp>
+        <p:nvCxnSpPr>
+          <p:cNvPr id="85" name="Straight Arrow Connector 84"/>
+          <p:cNvCxnSpPr/>
+          <p:nvPr/>
+        </p:nvCxnSpPr>
+        <p:spPr>
+          <a:xfrm flipV="1">
+            <a:off x="4109074" y="3358817"/>
+            <a:ext cx="1653" cy="162494"/>
+          </a:xfrm>
+          <a:prstGeom prst="straightConnector1">
+            <a:avLst/>
+          </a:prstGeom>
+          <a:ln>
+            <a:tailEnd type="triangle"/>
+          </a:ln>
+        </p:spPr>
+        <p:style>
+          <a:lnRef idx="3">
+            <a:schemeClr val="accent3"/>
+          </a:lnRef>
+          <a:fillRef idx="0">
+            <a:schemeClr val="accent3"/>
+          </a:fillRef>
+          <a:effectRef idx="2">
+            <a:schemeClr val="accent3"/>
+          </a:effectRef>
+          <a:fontRef idx="minor">
+            <a:schemeClr val="tx1"/>
+          </a:fontRef>
+        </p:style>
+      </p:cxnSp>
+    </p:spTree>
+    <p:extLst>
+      <p:ext uri="{BB962C8B-B14F-4D97-AF65-F5344CB8AC3E}">
+        <p14:creationId xmlns:p14="http://schemas.microsoft.com/office/powerpoint/2010/main" val="876494350"/>
+      </p:ext>
+    </p:extLst>
+  </p:cSld>
+  <p:clrMapOvr>
+    <a:masterClrMapping/>
+  </p:clrMapOvr>
+</p:sld>
+</file>
+
+<file path=ppt/slides/slide7.xml><?xml version="1.0" encoding="utf-8"?>
+<p:sld xmlns:a="http://schemas.openxmlformats.org/drawingml/2006/main" xmlns:r="http://schemas.openxmlformats.org/officeDocument/2006/relationships" xmlns:p="http://schemas.openxmlformats.org/presentationml/2006/main">
+  <p:cSld>
+    <p:spTree>
+      <p:nvGrpSpPr>
+        <p:cNvPr id="1" name=""/>
+        <p:cNvGrpSpPr/>
+        <p:nvPr/>
+      </p:nvGrpSpPr>
+      <p:grpSpPr>
+        <a:xfrm>
+          <a:off x="0" y="0"/>
+          <a:ext cx="0" cy="0"/>
+          <a:chOff x="0" y="0"/>
+          <a:chExt cx="0" cy="0"/>
+        </a:xfrm>
+      </p:grpSpPr>
+      <p:sp>
+        <p:nvSpPr>
+          <p:cNvPr id="2" name="Title 1"/>
+          <p:cNvSpPr>
+            <a:spLocks noGrp="1"/>
+          </p:cNvSpPr>
+          <p:nvPr>
+            <p:ph type="title"/>
+          </p:nvPr>
+        </p:nvSpPr>
+        <p:spPr/>
+        <p:txBody>
+          <a:bodyPr/>
+          <a:lstStyle/>
+          <a:p>
+            <a:r>
+              <a:rPr lang="en-US" altLang="zh-CN" dirty="0" smtClean="0"/>
               <a:t>PG</a:t>
             </a:r>
             <a:r>

</xml_diff>